<commit_message>
implement the isAnagram algrorithm
</commit_message>
<xml_diff>
--- a/recursivePatterns.pptx
+++ b/recursivePatterns.pptx
@@ -7,9 +7,11 @@
   <p:sldIdLst>
     <p:sldId id="256" r:id="rId2"/>
     <p:sldId id="257" r:id="rId3"/>
-    <p:sldId id="258" r:id="rId4"/>
-    <p:sldId id="259" r:id="rId5"/>
-    <p:sldId id="260" r:id="rId6"/>
+    <p:sldId id="262" r:id="rId4"/>
+    <p:sldId id="258" r:id="rId5"/>
+    <p:sldId id="259" r:id="rId6"/>
+    <p:sldId id="260" r:id="rId7"/>
+    <p:sldId id="261" r:id="rId8"/>
   </p:sldIdLst>
   <p:sldSz cx="9144000" cy="6858000" type="screen4x3"/>
   <p:notesSz cx="6858000" cy="9144000"/>
@@ -7605,8 +7607,8 @@
         </p:nvSpPr>
         <p:spPr>
           <a:xfrm>
-            <a:off x="3299108" y="533400"/>
-            <a:ext cx="3123356" cy="369332"/>
+            <a:off x="2514600" y="533400"/>
+            <a:ext cx="4083490" cy="369332"/>
           </a:xfrm>
           <a:prstGeom prst="rect">
             <a:avLst/>
@@ -7621,7 +7623,19 @@
           <a:p>
             <a:r>
               <a:rPr lang="en-US" dirty="0" smtClean="0"/>
-              <a:t>Calls to Recursive Permutations</a:t>
+              <a:t>Calls to Recursive </a:t>
+            </a:r>
+            <a:r>
+              <a:rPr lang="en-US" dirty="0" smtClean="0"/>
+              <a:t>Permutations for [</a:t>
+            </a:r>
+            <a:r>
+              <a:rPr lang="en-US" dirty="0" err="1" smtClean="0"/>
+              <a:t>a,b,c</a:t>
+            </a:r>
+            <a:r>
+              <a:rPr lang="en-US" dirty="0" smtClean="0"/>
+              <a:t>]</a:t>
             </a:r>
             <a:endParaRPr lang="en-US" dirty="0"/>
           </a:p>
@@ -8250,22 +8264,44 @@
       </p:grpSpPr>
       <p:sp>
         <p:nvSpPr>
-          <p:cNvPr id="2" name="Title 1"/>
-          <p:cNvSpPr>
-            <a:spLocks noGrp="1"/>
-          </p:cNvSpPr>
-          <p:nvPr>
-            <p:ph type="title"/>
-          </p:nvPr>
-        </p:nvSpPr>
-        <p:spPr/>
-        <p:txBody>
-          <a:bodyPr/>
-          <a:lstStyle/>
-          <a:p>
-            <a:r>
-              <a:rPr lang="en-US" dirty="0" smtClean="0"/>
-              <a:t>Exhaustive recursion is ‘exhaustive’</a:t>
+          <p:cNvPr id="4" name="TextBox 3"/>
+          <p:cNvSpPr txBox="1"/>
+          <p:nvPr/>
+        </p:nvSpPr>
+        <p:spPr>
+          <a:xfrm>
+            <a:off x="4082363" y="1371600"/>
+            <a:ext cx="1202573" cy="369332"/>
+          </a:xfrm>
+          <a:prstGeom prst="rect">
+            <a:avLst/>
+          </a:prstGeom>
+          <a:noFill/>
+          <a:ln>
+            <a:solidFill>
+              <a:schemeClr val="bg1">
+                <a:lumMod val="65000"/>
+              </a:schemeClr>
+            </a:solidFill>
+          </a:ln>
+        </p:spPr>
+        <p:txBody>
+          <a:bodyPr wrap="none" rtlCol="0">
+            <a:spAutoFit/>
+          </a:bodyPr>
+          <a:lstStyle/>
+          <a:p>
+            <a:r>
+              <a:rPr lang="en-US" dirty="0" smtClean="0"/>
+              <a:t>[], [</a:t>
+            </a:r>
+            <a:r>
+              <a:rPr lang="en-US" dirty="0" err="1" smtClean="0"/>
+              <a:t>a,b,c,d</a:t>
+            </a:r>
+            <a:r>
+              <a:rPr lang="en-US" dirty="0" smtClean="0"/>
+              <a:t>]</a:t>
             </a:r>
             <a:endParaRPr lang="en-US" dirty="0"/>
           </a:p>
@@ -8273,324 +8309,1791 @@
       </p:sp>
       <p:sp>
         <p:nvSpPr>
-          <p:cNvPr id="3" name="Content Placeholder 2"/>
-          <p:cNvSpPr>
-            <a:spLocks noGrp="1"/>
-          </p:cNvSpPr>
-          <p:nvPr>
-            <p:ph idx="1"/>
-          </p:nvPr>
-        </p:nvSpPr>
-        <p:spPr/>
-        <p:txBody>
-          <a:bodyPr>
-            <a:normAutofit/>
+          <p:cNvPr id="5" name="TextBox 4"/>
+          <p:cNvSpPr txBox="1"/>
+          <p:nvPr/>
+        </p:nvSpPr>
+        <p:spPr>
+          <a:xfrm>
+            <a:off x="2362200" y="2971800"/>
+            <a:ext cx="1144865" cy="369332"/>
+          </a:xfrm>
+          <a:prstGeom prst="rect">
+            <a:avLst/>
+          </a:prstGeom>
+          <a:noFill/>
+          <a:ln>
+            <a:solidFill>
+              <a:schemeClr val="bg1">
+                <a:lumMod val="65000"/>
+              </a:schemeClr>
+            </a:solidFill>
+          </a:ln>
+        </p:spPr>
+        <p:txBody>
+          <a:bodyPr wrap="none" rtlCol="0">
+            <a:spAutoFit/>
           </a:bodyPr>
           <a:lstStyle/>
           <a:p>
-            <a:pPr>
-              <a:buNone/>
-            </a:pPr>
-            <a:r>
-              <a:rPr lang="en-US" sz="1800" dirty="0" err="1" smtClean="0"/>
-              <a:t>var</a:t>
-            </a:r>
-            <a:r>
-              <a:rPr lang="en-US" sz="1800" dirty="0" smtClean="0"/>
-              <a:t> </a:t>
-            </a:r>
-            <a:r>
-              <a:rPr lang="en-US" sz="1800" dirty="0" err="1" smtClean="0"/>
-              <a:t>recPerms</a:t>
-            </a:r>
-            <a:r>
-              <a:rPr lang="en-US" sz="1800" dirty="0" smtClean="0"/>
-              <a:t> = function(</a:t>
-            </a:r>
-            <a:r>
-              <a:rPr lang="en-US" sz="1800" dirty="0" err="1" smtClean="0"/>
-              <a:t>sofar</a:t>
-            </a:r>
-            <a:r>
-              <a:rPr lang="en-US" sz="1800" dirty="0" smtClean="0"/>
-              <a:t>, rest){ </a:t>
-            </a:r>
-          </a:p>
-          <a:p>
-            <a:pPr>
-              <a:buNone/>
-            </a:pPr>
-            <a:r>
-              <a:rPr lang="en-US" sz="1800" dirty="0" smtClean="0"/>
-              <a:t> </a:t>
-            </a:r>
-            <a:r>
-              <a:rPr lang="en-US" sz="1800" dirty="0" smtClean="0"/>
-              <a:t> if( </a:t>
-            </a:r>
-            <a:r>
-              <a:rPr lang="en-US" sz="1800" dirty="0" err="1" smtClean="0"/>
-              <a:t>rest.length</a:t>
-            </a:r>
-            <a:r>
-              <a:rPr lang="en-US" sz="1800" dirty="0" smtClean="0"/>
-              <a:t> === 0) { </a:t>
-            </a:r>
-          </a:p>
-          <a:p>
-            <a:pPr>
-              <a:buNone/>
-            </a:pPr>
-            <a:r>
-              <a:rPr lang="en-US" sz="1800" dirty="0" smtClean="0"/>
-              <a:t> </a:t>
-            </a:r>
-            <a:r>
-              <a:rPr lang="en-US" sz="1800" dirty="0" smtClean="0"/>
-              <a:t>   console.log(‘base case reached:’, </a:t>
-            </a:r>
-            <a:r>
-              <a:rPr lang="en-US" sz="1800" dirty="0" err="1" smtClean="0"/>
-              <a:t>sofar</a:t>
-            </a:r>
-            <a:r>
-              <a:rPr lang="en-US" sz="1800" dirty="0" smtClean="0"/>
-              <a:t>);</a:t>
-            </a:r>
-          </a:p>
-          <a:p>
-            <a:pPr>
-              <a:buNone/>
-            </a:pPr>
-            <a:r>
-              <a:rPr lang="en-US" sz="1800" dirty="0" smtClean="0"/>
-              <a:t>  } else { </a:t>
-            </a:r>
-          </a:p>
-          <a:p>
-            <a:pPr>
-              <a:buNone/>
-            </a:pPr>
-            <a:r>
-              <a:rPr lang="en-US" sz="1800" dirty="0" smtClean="0"/>
-              <a:t> </a:t>
-            </a:r>
-            <a:r>
-              <a:rPr lang="en-US" sz="1800" dirty="0" smtClean="0"/>
-              <a:t>   for( </a:t>
-            </a:r>
-            <a:r>
-              <a:rPr lang="en-US" sz="1800" dirty="0" err="1" smtClean="0"/>
-              <a:t>var</a:t>
-            </a:r>
-            <a:r>
-              <a:rPr lang="en-US" sz="1800" dirty="0" smtClean="0"/>
-              <a:t> </a:t>
-            </a:r>
-            <a:r>
-              <a:rPr lang="en-US" sz="1800" dirty="0" err="1" smtClean="0"/>
-              <a:t>i</a:t>
-            </a:r>
-            <a:r>
-              <a:rPr lang="en-US" sz="1800" dirty="0" smtClean="0"/>
-              <a:t> = 0; </a:t>
-            </a:r>
-            <a:r>
-              <a:rPr lang="en-US" sz="1800" dirty="0" err="1" smtClean="0"/>
-              <a:t>i</a:t>
-            </a:r>
-            <a:r>
-              <a:rPr lang="en-US" sz="1800" dirty="0" smtClean="0"/>
-              <a:t> &lt; </a:t>
-            </a:r>
-            <a:r>
-              <a:rPr lang="en-US" sz="1800" dirty="0" err="1" smtClean="0"/>
-              <a:t>rest.length</a:t>
-            </a:r>
-            <a:r>
-              <a:rPr lang="en-US" sz="1800" dirty="0" smtClean="0"/>
-              <a:t>; </a:t>
-            </a:r>
-            <a:r>
-              <a:rPr lang="en-US" sz="1800" dirty="0" err="1" smtClean="0"/>
-              <a:t>i</a:t>
-            </a:r>
-            <a:r>
-              <a:rPr lang="en-US" sz="1800" dirty="0" smtClean="0"/>
-              <a:t>++ ){ </a:t>
-            </a:r>
-          </a:p>
-          <a:p>
-            <a:pPr>
-              <a:buNone/>
-            </a:pPr>
-            <a:r>
-              <a:rPr lang="en-US" sz="1800" dirty="0" smtClean="0"/>
-              <a:t> </a:t>
-            </a:r>
-            <a:r>
-              <a:rPr lang="en-US" sz="1800" dirty="0" smtClean="0"/>
-              <a:t>     </a:t>
-            </a:r>
-            <a:r>
-              <a:rPr lang="en-US" sz="1800" dirty="0" err="1" smtClean="0"/>
-              <a:t>var</a:t>
-            </a:r>
-            <a:r>
-              <a:rPr lang="en-US" sz="1800" dirty="0" smtClean="0"/>
-              <a:t> remaining = </a:t>
-            </a:r>
-            <a:r>
-              <a:rPr lang="en-US" sz="1800" dirty="0" err="1" smtClean="0"/>
-              <a:t>rest.slice</a:t>
-            </a:r>
-            <a:r>
-              <a:rPr lang="en-US" sz="1800" dirty="0" smtClean="0"/>
-              <a:t>(); </a:t>
-            </a:r>
-          </a:p>
-          <a:p>
-            <a:pPr>
-              <a:buNone/>
-            </a:pPr>
-            <a:r>
-              <a:rPr lang="en-US" sz="1800" dirty="0" smtClean="0"/>
-              <a:t> </a:t>
-            </a:r>
-            <a:r>
-              <a:rPr lang="en-US" sz="1800" dirty="0" smtClean="0"/>
-              <a:t>     </a:t>
-            </a:r>
-            <a:r>
-              <a:rPr lang="en-US" sz="1800" dirty="0" err="1" smtClean="0"/>
-              <a:t>remaining.splice</a:t>
-            </a:r>
-            <a:r>
-              <a:rPr lang="en-US" sz="1800" dirty="0" smtClean="0"/>
-              <a:t>(</a:t>
-            </a:r>
-            <a:r>
-              <a:rPr lang="en-US" sz="1800" dirty="0" err="1" smtClean="0"/>
-              <a:t>i</a:t>
-            </a:r>
-            <a:r>
-              <a:rPr lang="en-US" sz="1800" dirty="0" smtClean="0"/>
-              <a:t>, 1); </a:t>
-            </a:r>
-          </a:p>
-          <a:p>
-            <a:pPr>
-              <a:buNone/>
-            </a:pPr>
-            <a:r>
-              <a:rPr lang="en-US" sz="1800" dirty="0" smtClean="0"/>
-              <a:t> </a:t>
-            </a:r>
-            <a:r>
-              <a:rPr lang="en-US" sz="1800" dirty="0" smtClean="0"/>
-              <a:t>     </a:t>
-            </a:r>
-            <a:r>
-              <a:rPr lang="en-US" sz="1800" dirty="0" err="1" smtClean="0"/>
-              <a:t>var</a:t>
-            </a:r>
-            <a:r>
-              <a:rPr lang="en-US" sz="1800" dirty="0" smtClean="0"/>
-              <a:t> next = </a:t>
-            </a:r>
-            <a:r>
-              <a:rPr lang="en-US" sz="1800" dirty="0" err="1" smtClean="0"/>
-              <a:t>sofar.slice</a:t>
-            </a:r>
-            <a:r>
-              <a:rPr lang="en-US" sz="1800" dirty="0" smtClean="0"/>
-              <a:t>(); </a:t>
-            </a:r>
-          </a:p>
-          <a:p>
-            <a:pPr>
-              <a:buNone/>
-            </a:pPr>
-            <a:r>
-              <a:rPr lang="en-US" sz="1800" dirty="0" smtClean="0"/>
-              <a:t> </a:t>
-            </a:r>
-            <a:r>
-              <a:rPr lang="en-US" sz="1800" dirty="0" smtClean="0"/>
-              <a:t>     </a:t>
-            </a:r>
-            <a:r>
-              <a:rPr lang="en-US" sz="1800" dirty="0" err="1" smtClean="0"/>
-              <a:t>next.push</a:t>
-            </a:r>
-            <a:r>
-              <a:rPr lang="en-US" sz="1800" dirty="0" smtClean="0"/>
-              <a:t>(rest[</a:t>
-            </a:r>
-            <a:r>
-              <a:rPr lang="en-US" sz="1800" dirty="0" err="1" smtClean="0"/>
-              <a:t>i</a:t>
-            </a:r>
-            <a:r>
-              <a:rPr lang="en-US" sz="1800" dirty="0" smtClean="0"/>
-              <a:t>]); </a:t>
-            </a:r>
-          </a:p>
-          <a:p>
-            <a:pPr>
-              <a:buNone/>
-            </a:pPr>
-            <a:r>
-              <a:rPr lang="en-US" sz="1800" dirty="0" smtClean="0"/>
-              <a:t> </a:t>
-            </a:r>
-            <a:r>
-              <a:rPr lang="en-US" sz="1800" dirty="0" smtClean="0"/>
-              <a:t>     </a:t>
-            </a:r>
-            <a:r>
-              <a:rPr lang="en-US" sz="1800" dirty="0" err="1" smtClean="0"/>
-              <a:t>recPerms</a:t>
-            </a:r>
-            <a:r>
-              <a:rPr lang="en-US" sz="1800" dirty="0" smtClean="0"/>
-              <a:t>(next, remaining);</a:t>
-            </a:r>
-          </a:p>
-          <a:p>
-            <a:pPr>
-              <a:buNone/>
-            </a:pPr>
-            <a:r>
-              <a:rPr lang="en-US" sz="1800" dirty="0" smtClean="0"/>
-              <a:t>    }</a:t>
-            </a:r>
-          </a:p>
-          <a:p>
-            <a:pPr>
-              <a:buNone/>
-            </a:pPr>
-            <a:r>
-              <a:rPr lang="en-US" sz="1800" dirty="0" smtClean="0"/>
-              <a:t> </a:t>
-            </a:r>
-            <a:r>
-              <a:rPr lang="en-US" sz="1800" dirty="0" smtClean="0"/>
-              <a:t> }</a:t>
-            </a:r>
-          </a:p>
-          <a:p>
-            <a:pPr>
-              <a:buNone/>
-            </a:pPr>
-            <a:r>
-              <a:rPr lang="en-US" sz="1800" dirty="0" smtClean="0"/>
-              <a:t>}</a:t>
-            </a:r>
-            <a:endParaRPr lang="en-US" sz="1800" dirty="0" smtClean="0"/>
-          </a:p>
-        </p:txBody>
-      </p:sp>
+            <a:r>
+              <a:rPr lang="en-US" dirty="0" smtClean="0"/>
+              <a:t>[a], [</a:t>
+            </a:r>
+            <a:r>
+              <a:rPr lang="en-US" dirty="0" err="1" smtClean="0"/>
+              <a:t>b,c,d</a:t>
+            </a:r>
+            <a:r>
+              <a:rPr lang="en-US" dirty="0" smtClean="0"/>
+              <a:t>]</a:t>
+            </a:r>
+            <a:endParaRPr lang="en-US" dirty="0"/>
+          </a:p>
+        </p:txBody>
+      </p:sp>
+      <p:sp>
+        <p:nvSpPr>
+          <p:cNvPr id="6" name="TextBox 5"/>
+          <p:cNvSpPr txBox="1"/>
+          <p:nvPr/>
+        </p:nvSpPr>
+        <p:spPr>
+          <a:xfrm>
+            <a:off x="1141135" y="3810000"/>
+            <a:ext cx="1144865" cy="369332"/>
+          </a:xfrm>
+          <a:prstGeom prst="rect">
+            <a:avLst/>
+          </a:prstGeom>
+          <a:noFill/>
+          <a:ln>
+            <a:solidFill>
+              <a:schemeClr val="bg1">
+                <a:lumMod val="65000"/>
+              </a:schemeClr>
+            </a:solidFill>
+          </a:ln>
+        </p:spPr>
+        <p:txBody>
+          <a:bodyPr wrap="none" rtlCol="0">
+            <a:spAutoFit/>
+          </a:bodyPr>
+          <a:lstStyle/>
+          <a:p>
+            <a:r>
+              <a:rPr lang="en-US" dirty="0" smtClean="0"/>
+              <a:t>[</a:t>
+            </a:r>
+            <a:r>
+              <a:rPr lang="en-US" dirty="0" err="1" smtClean="0"/>
+              <a:t>a,b</a:t>
+            </a:r>
+            <a:r>
+              <a:rPr lang="en-US" dirty="0" smtClean="0"/>
+              <a:t>], [</a:t>
+            </a:r>
+            <a:r>
+              <a:rPr lang="en-US" dirty="0" err="1" smtClean="0"/>
+              <a:t>c,d</a:t>
+            </a:r>
+            <a:r>
+              <a:rPr lang="en-US" dirty="0" smtClean="0"/>
+              <a:t>]</a:t>
+            </a:r>
+            <a:endParaRPr lang="en-US" dirty="0"/>
+          </a:p>
+        </p:txBody>
+      </p:sp>
+      <p:sp>
+        <p:nvSpPr>
+          <p:cNvPr id="7" name="TextBox 6"/>
+          <p:cNvSpPr txBox="1"/>
+          <p:nvPr/>
+        </p:nvSpPr>
+        <p:spPr>
+          <a:xfrm>
+            <a:off x="990600" y="5955268"/>
+            <a:ext cx="1255472" cy="369332"/>
+          </a:xfrm>
+          <a:prstGeom prst="rect">
+            <a:avLst/>
+          </a:prstGeom>
+          <a:noFill/>
+          <a:ln w="31750">
+            <a:solidFill>
+              <a:srgbClr val="00B050"/>
+            </a:solidFill>
+          </a:ln>
+        </p:spPr>
+        <p:txBody>
+          <a:bodyPr wrap="none" rtlCol="0">
+            <a:spAutoFit/>
+          </a:bodyPr>
+          <a:lstStyle/>
+          <a:p>
+            <a:r>
+              <a:rPr lang="en-US" dirty="0" smtClean="0"/>
+              <a:t>[</a:t>
+            </a:r>
+            <a:r>
+              <a:rPr lang="en-US" dirty="0" err="1" smtClean="0"/>
+              <a:t>a,b,c,d</a:t>
+            </a:r>
+            <a:r>
+              <a:rPr lang="en-US" dirty="0" smtClean="0"/>
+              <a:t>], </a:t>
+            </a:r>
+            <a:r>
+              <a:rPr lang="en-US" dirty="0" smtClean="0"/>
+              <a:t>[] </a:t>
+            </a:r>
+          </a:p>
+        </p:txBody>
+      </p:sp>
+      <p:sp>
+        <p:nvSpPr>
+          <p:cNvPr id="9" name="TextBox 8"/>
+          <p:cNvSpPr txBox="1"/>
+          <p:nvPr/>
+        </p:nvSpPr>
+        <p:spPr>
+          <a:xfrm>
+            <a:off x="4341535" y="3810000"/>
+            <a:ext cx="1143000" cy="369332"/>
+          </a:xfrm>
+          <a:prstGeom prst="rect">
+            <a:avLst/>
+          </a:prstGeom>
+          <a:noFill/>
+          <a:ln>
+            <a:solidFill>
+              <a:schemeClr val="bg1">
+                <a:lumMod val="65000"/>
+              </a:schemeClr>
+            </a:solidFill>
+          </a:ln>
+        </p:spPr>
+        <p:txBody>
+          <a:bodyPr wrap="square" rtlCol="0">
+            <a:spAutoFit/>
+          </a:bodyPr>
+          <a:lstStyle/>
+          <a:p>
+            <a:r>
+              <a:rPr lang="en-US" dirty="0" smtClean="0"/>
+              <a:t>[</a:t>
+            </a:r>
+            <a:r>
+              <a:rPr lang="en-US" dirty="0" err="1" smtClean="0"/>
+              <a:t>a,c</a:t>
+            </a:r>
+            <a:r>
+              <a:rPr lang="en-US" dirty="0" smtClean="0"/>
+              <a:t>], [</a:t>
+            </a:r>
+            <a:r>
+              <a:rPr lang="en-US" dirty="0" err="1" smtClean="0"/>
+              <a:t>b,d</a:t>
+            </a:r>
+            <a:r>
+              <a:rPr lang="en-US" dirty="0" smtClean="0"/>
+              <a:t>]</a:t>
+            </a:r>
+            <a:endParaRPr lang="en-US" dirty="0"/>
+          </a:p>
+        </p:txBody>
+      </p:sp>
+      <p:sp>
+        <p:nvSpPr>
+          <p:cNvPr id="10" name="TextBox 9"/>
+          <p:cNvSpPr txBox="1"/>
+          <p:nvPr/>
+        </p:nvSpPr>
+        <p:spPr>
+          <a:xfrm>
+            <a:off x="2362200" y="5955268"/>
+            <a:ext cx="1327837" cy="369332"/>
+          </a:xfrm>
+          <a:prstGeom prst="rect">
+            <a:avLst/>
+          </a:prstGeom>
+          <a:noFill/>
+          <a:ln w="31750">
+            <a:solidFill>
+              <a:srgbClr val="00B050"/>
+            </a:solidFill>
+          </a:ln>
+        </p:spPr>
+        <p:txBody>
+          <a:bodyPr wrap="square" rtlCol="0">
+            <a:spAutoFit/>
+          </a:bodyPr>
+          <a:lstStyle/>
+          <a:p>
+            <a:r>
+              <a:rPr lang="en-US" dirty="0" smtClean="0"/>
+              <a:t>[</a:t>
+            </a:r>
+            <a:r>
+              <a:rPr lang="en-US" dirty="0" err="1" smtClean="0"/>
+              <a:t>a,b,d,c</a:t>
+            </a:r>
+            <a:r>
+              <a:rPr lang="en-US" dirty="0" smtClean="0"/>
+              <a:t>], </a:t>
+            </a:r>
+            <a:r>
+              <a:rPr lang="en-US" dirty="0" smtClean="0"/>
+              <a:t>[]</a:t>
+            </a:r>
+            <a:endParaRPr lang="en-US" dirty="0"/>
+          </a:p>
+        </p:txBody>
+      </p:sp>
+      <p:cxnSp>
+        <p:nvCxnSpPr>
+          <p:cNvPr id="20" name="Straight Arrow Connector 19"/>
+          <p:cNvCxnSpPr>
+            <a:stCxn id="4" idx="2"/>
+            <a:endCxn id="5" idx="0"/>
+          </p:cNvCxnSpPr>
+          <p:nvPr/>
+        </p:nvCxnSpPr>
+        <p:spPr>
+          <a:xfrm flipH="1">
+            <a:off x="2934633" y="1740932"/>
+            <a:ext cx="1749017" cy="1230868"/>
+          </a:xfrm>
+          <a:prstGeom prst="straightConnector1">
+            <a:avLst/>
+          </a:prstGeom>
+          <a:ln>
+            <a:solidFill>
+              <a:srgbClr val="00B050"/>
+            </a:solidFill>
+            <a:tailEnd type="arrow"/>
+          </a:ln>
+        </p:spPr>
+        <p:style>
+          <a:lnRef idx="1">
+            <a:schemeClr val="accent1"/>
+          </a:lnRef>
+          <a:fillRef idx="0">
+            <a:schemeClr val="accent1"/>
+          </a:fillRef>
+          <a:effectRef idx="0">
+            <a:schemeClr val="accent1"/>
+          </a:effectRef>
+          <a:fontRef idx="minor">
+            <a:schemeClr val="tx1"/>
+          </a:fontRef>
+        </p:style>
+      </p:cxnSp>
+      <p:cxnSp>
+        <p:nvCxnSpPr>
+          <p:cNvPr id="21" name="Straight Arrow Connector 20"/>
+          <p:cNvCxnSpPr>
+            <a:stCxn id="6" idx="2"/>
+            <a:endCxn id="82" idx="0"/>
+          </p:cNvCxnSpPr>
+          <p:nvPr/>
+        </p:nvCxnSpPr>
+        <p:spPr>
+          <a:xfrm flipH="1">
+            <a:off x="1637368" y="4179332"/>
+            <a:ext cx="76200" cy="468868"/>
+          </a:xfrm>
+          <a:prstGeom prst="straightConnector1">
+            <a:avLst/>
+          </a:prstGeom>
+          <a:ln>
+            <a:solidFill>
+              <a:srgbClr val="00B050"/>
+            </a:solidFill>
+            <a:tailEnd type="arrow"/>
+          </a:ln>
+        </p:spPr>
+        <p:style>
+          <a:lnRef idx="1">
+            <a:schemeClr val="accent1"/>
+          </a:lnRef>
+          <a:fillRef idx="0">
+            <a:schemeClr val="accent1"/>
+          </a:fillRef>
+          <a:effectRef idx="0">
+            <a:schemeClr val="accent1"/>
+          </a:effectRef>
+          <a:fontRef idx="minor">
+            <a:schemeClr val="tx1"/>
+          </a:fontRef>
+        </p:style>
+      </p:cxnSp>
+      <p:cxnSp>
+        <p:nvCxnSpPr>
+          <p:cNvPr id="23" name="Straight Arrow Connector 22"/>
+          <p:cNvCxnSpPr>
+            <a:stCxn id="5" idx="2"/>
+            <a:endCxn id="6" idx="0"/>
+          </p:cNvCxnSpPr>
+          <p:nvPr/>
+        </p:nvCxnSpPr>
+        <p:spPr>
+          <a:xfrm flipH="1">
+            <a:off x="1713568" y="3341132"/>
+            <a:ext cx="1221065" cy="468868"/>
+          </a:xfrm>
+          <a:prstGeom prst="straightConnector1">
+            <a:avLst/>
+          </a:prstGeom>
+          <a:ln>
+            <a:solidFill>
+              <a:srgbClr val="00B050"/>
+            </a:solidFill>
+            <a:tailEnd type="arrow"/>
+          </a:ln>
+        </p:spPr>
+        <p:style>
+          <a:lnRef idx="1">
+            <a:schemeClr val="accent1"/>
+          </a:lnRef>
+          <a:fillRef idx="0">
+            <a:schemeClr val="accent1"/>
+          </a:fillRef>
+          <a:effectRef idx="0">
+            <a:schemeClr val="accent1"/>
+          </a:effectRef>
+          <a:fontRef idx="minor">
+            <a:schemeClr val="tx1"/>
+          </a:fontRef>
+        </p:style>
+      </p:cxnSp>
+      <p:cxnSp>
+        <p:nvCxnSpPr>
+          <p:cNvPr id="30" name="Straight Arrow Connector 29"/>
+          <p:cNvCxnSpPr>
+            <a:stCxn id="6" idx="2"/>
+            <a:endCxn id="84" idx="0"/>
+          </p:cNvCxnSpPr>
+          <p:nvPr/>
+        </p:nvCxnSpPr>
+        <p:spPr>
+          <a:xfrm>
+            <a:off x="1713568" y="4179332"/>
+            <a:ext cx="1219200" cy="480536"/>
+          </a:xfrm>
+          <a:prstGeom prst="straightConnector1">
+            <a:avLst/>
+          </a:prstGeom>
+          <a:ln>
+            <a:solidFill>
+              <a:srgbClr val="00B050"/>
+            </a:solidFill>
+            <a:tailEnd type="arrow"/>
+          </a:ln>
+        </p:spPr>
+        <p:style>
+          <a:lnRef idx="1">
+            <a:schemeClr val="accent1"/>
+          </a:lnRef>
+          <a:fillRef idx="0">
+            <a:schemeClr val="accent1"/>
+          </a:fillRef>
+          <a:effectRef idx="0">
+            <a:schemeClr val="accent1"/>
+          </a:effectRef>
+          <a:fontRef idx="minor">
+            <a:schemeClr val="tx1"/>
+          </a:fontRef>
+        </p:style>
+      </p:cxnSp>
+      <p:cxnSp>
+        <p:nvCxnSpPr>
+          <p:cNvPr id="33" name="Straight Arrow Connector 32"/>
+          <p:cNvCxnSpPr>
+            <a:stCxn id="5" idx="2"/>
+            <a:endCxn id="9" idx="0"/>
+          </p:cNvCxnSpPr>
+          <p:nvPr/>
+        </p:nvCxnSpPr>
+        <p:spPr>
+          <a:xfrm>
+            <a:off x="2934633" y="3341132"/>
+            <a:ext cx="1978402" cy="468868"/>
+          </a:xfrm>
+          <a:prstGeom prst="straightConnector1">
+            <a:avLst/>
+          </a:prstGeom>
+          <a:ln>
+            <a:solidFill>
+              <a:srgbClr val="00B050"/>
+            </a:solidFill>
+            <a:tailEnd type="arrow"/>
+          </a:ln>
+        </p:spPr>
+        <p:style>
+          <a:lnRef idx="1">
+            <a:schemeClr val="accent1"/>
+          </a:lnRef>
+          <a:fillRef idx="0">
+            <a:schemeClr val="accent1"/>
+          </a:fillRef>
+          <a:effectRef idx="0">
+            <a:schemeClr val="accent1"/>
+          </a:effectRef>
+          <a:fontRef idx="minor">
+            <a:schemeClr val="tx1"/>
+          </a:fontRef>
+        </p:style>
+      </p:cxnSp>
+      <p:cxnSp>
+        <p:nvCxnSpPr>
+          <p:cNvPr id="44" name="Straight Arrow Connector 43"/>
+          <p:cNvCxnSpPr>
+            <a:stCxn id="4" idx="2"/>
+            <a:endCxn id="54" idx="0"/>
+          </p:cNvCxnSpPr>
+          <p:nvPr/>
+        </p:nvCxnSpPr>
+        <p:spPr>
+          <a:xfrm>
+            <a:off x="4683650" y="1740932"/>
+            <a:ext cx="2060983" cy="1242536"/>
+          </a:xfrm>
+          <a:prstGeom prst="straightConnector1">
+            <a:avLst/>
+          </a:prstGeom>
+          <a:ln>
+            <a:solidFill>
+              <a:schemeClr val="bg1">
+                <a:lumMod val="65000"/>
+              </a:schemeClr>
+            </a:solidFill>
+            <a:tailEnd type="arrow"/>
+          </a:ln>
+        </p:spPr>
+        <p:style>
+          <a:lnRef idx="1">
+            <a:schemeClr val="accent1"/>
+          </a:lnRef>
+          <a:fillRef idx="0">
+            <a:schemeClr val="accent1"/>
+          </a:fillRef>
+          <a:effectRef idx="0">
+            <a:schemeClr val="accent1"/>
+          </a:effectRef>
+          <a:fontRef idx="minor">
+            <a:schemeClr val="tx1"/>
+          </a:fontRef>
+        </p:style>
+      </p:cxnSp>
+      <p:sp>
+        <p:nvSpPr>
+          <p:cNvPr id="68" name="TextBox 67"/>
+          <p:cNvSpPr txBox="1"/>
+          <p:nvPr/>
+        </p:nvSpPr>
+        <p:spPr>
+          <a:xfrm>
+            <a:off x="3124200" y="2450068"/>
+            <a:ext cx="301686" cy="369332"/>
+          </a:xfrm>
+          <a:prstGeom prst="rect">
+            <a:avLst/>
+          </a:prstGeom>
+          <a:noFill/>
+        </p:spPr>
+        <p:txBody>
+          <a:bodyPr wrap="none" rtlCol="0">
+            <a:spAutoFit/>
+          </a:bodyPr>
+          <a:lstStyle/>
+          <a:p>
+            <a:r>
+              <a:rPr lang="en-US" dirty="0" smtClean="0"/>
+              <a:t>0</a:t>
+            </a:r>
+            <a:endParaRPr lang="en-US" dirty="0"/>
+          </a:p>
+        </p:txBody>
+      </p:sp>
+      <p:sp>
+        <p:nvSpPr>
+          <p:cNvPr id="69" name="TextBox 68"/>
+          <p:cNvSpPr txBox="1"/>
+          <p:nvPr/>
+        </p:nvSpPr>
+        <p:spPr>
+          <a:xfrm>
+            <a:off x="1447800" y="3440668"/>
+            <a:ext cx="301686" cy="369332"/>
+          </a:xfrm>
+          <a:prstGeom prst="rect">
+            <a:avLst/>
+          </a:prstGeom>
+          <a:noFill/>
+        </p:spPr>
+        <p:txBody>
+          <a:bodyPr wrap="none" rtlCol="0">
+            <a:spAutoFit/>
+          </a:bodyPr>
+          <a:lstStyle/>
+          <a:p>
+            <a:r>
+              <a:rPr lang="en-US" dirty="0"/>
+              <a:t>1</a:t>
+            </a:r>
+          </a:p>
+        </p:txBody>
+      </p:sp>
+      <p:sp>
+        <p:nvSpPr>
+          <p:cNvPr id="70" name="TextBox 69"/>
+          <p:cNvSpPr txBox="1"/>
+          <p:nvPr/>
+        </p:nvSpPr>
+        <p:spPr>
+          <a:xfrm>
+            <a:off x="2667000" y="3429000"/>
+            <a:ext cx="301686" cy="369332"/>
+          </a:xfrm>
+          <a:prstGeom prst="rect">
+            <a:avLst/>
+          </a:prstGeom>
+          <a:noFill/>
+        </p:spPr>
+        <p:txBody>
+          <a:bodyPr wrap="none" rtlCol="0">
+            <a:spAutoFit/>
+          </a:bodyPr>
+          <a:lstStyle/>
+          <a:p>
+            <a:r>
+              <a:rPr lang="en-US" dirty="0" smtClean="0"/>
+              <a:t>3</a:t>
+            </a:r>
+            <a:endParaRPr lang="en-US" dirty="0"/>
+          </a:p>
+        </p:txBody>
+      </p:sp>
+      <p:sp>
+        <p:nvSpPr>
+          <p:cNvPr id="72" name="TextBox 71"/>
+          <p:cNvSpPr txBox="1"/>
+          <p:nvPr/>
+        </p:nvSpPr>
+        <p:spPr>
+          <a:xfrm>
+            <a:off x="1982449" y="4191000"/>
+            <a:ext cx="301686" cy="369332"/>
+          </a:xfrm>
+          <a:prstGeom prst="rect">
+            <a:avLst/>
+          </a:prstGeom>
+          <a:noFill/>
+        </p:spPr>
+        <p:txBody>
+          <a:bodyPr wrap="none" rtlCol="0">
+            <a:spAutoFit/>
+          </a:bodyPr>
+          <a:lstStyle/>
+          <a:p>
+            <a:r>
+              <a:rPr lang="en-US" dirty="0"/>
+              <a:t>2</a:t>
+            </a:r>
+          </a:p>
+        </p:txBody>
+      </p:sp>
+      <p:sp>
+        <p:nvSpPr>
+          <p:cNvPr id="73" name="TextBox 72"/>
+          <p:cNvSpPr txBox="1"/>
+          <p:nvPr/>
+        </p:nvSpPr>
+        <p:spPr>
+          <a:xfrm>
+            <a:off x="3430249" y="4202668"/>
+            <a:ext cx="301686" cy="369332"/>
+          </a:xfrm>
+          <a:prstGeom prst="rect">
+            <a:avLst/>
+          </a:prstGeom>
+          <a:noFill/>
+        </p:spPr>
+        <p:txBody>
+          <a:bodyPr wrap="square" rtlCol="0">
+            <a:spAutoFit/>
+          </a:bodyPr>
+          <a:lstStyle/>
+          <a:p>
+            <a:r>
+              <a:rPr lang="en-US" dirty="0" smtClean="0"/>
+              <a:t>4</a:t>
+            </a:r>
+            <a:endParaRPr lang="en-US" dirty="0"/>
+          </a:p>
+        </p:txBody>
+      </p:sp>
+      <p:sp>
+        <p:nvSpPr>
+          <p:cNvPr id="75" name="TextBox 74"/>
+          <p:cNvSpPr txBox="1"/>
+          <p:nvPr/>
+        </p:nvSpPr>
+        <p:spPr>
+          <a:xfrm>
+            <a:off x="4267200" y="2590800"/>
+            <a:ext cx="301686" cy="369332"/>
+          </a:xfrm>
+          <a:prstGeom prst="rect">
+            <a:avLst/>
+          </a:prstGeom>
+          <a:noFill/>
+        </p:spPr>
+        <p:txBody>
+          <a:bodyPr wrap="none" rtlCol="0">
+            <a:spAutoFit/>
+          </a:bodyPr>
+          <a:lstStyle/>
+          <a:p>
+            <a:r>
+              <a:rPr lang="en-US" dirty="0" smtClean="0"/>
+              <a:t>5</a:t>
+            </a:r>
+            <a:endParaRPr lang="en-US" dirty="0"/>
+          </a:p>
+        </p:txBody>
+      </p:sp>
+      <p:sp>
+        <p:nvSpPr>
+          <p:cNvPr id="83" name="TextBox 82"/>
+          <p:cNvSpPr txBox="1"/>
+          <p:nvPr/>
+        </p:nvSpPr>
+        <p:spPr>
+          <a:xfrm>
+            <a:off x="-76200" y="5830669"/>
+            <a:ext cx="1117614" cy="646331"/>
+          </a:xfrm>
+          <a:prstGeom prst="rect">
+            <a:avLst/>
+          </a:prstGeom>
+          <a:noFill/>
+        </p:spPr>
+        <p:txBody>
+          <a:bodyPr wrap="none" rtlCol="0">
+            <a:spAutoFit/>
+          </a:bodyPr>
+          <a:lstStyle/>
+          <a:p>
+            <a:r>
+              <a:rPr lang="en-US" dirty="0" smtClean="0"/>
+              <a:t>Recursive</a:t>
+            </a:r>
+          </a:p>
+          <a:p>
+            <a:r>
+              <a:rPr lang="en-US" dirty="0" smtClean="0"/>
+              <a:t>Base Case</a:t>
+            </a:r>
+            <a:endParaRPr lang="en-US" dirty="0"/>
+          </a:p>
+        </p:txBody>
+      </p:sp>
+      <p:sp>
+        <p:nvSpPr>
+          <p:cNvPr id="85" name="TextBox 84"/>
+          <p:cNvSpPr txBox="1"/>
+          <p:nvPr/>
+        </p:nvSpPr>
+        <p:spPr>
+          <a:xfrm>
+            <a:off x="1828800" y="533400"/>
+            <a:ext cx="5434886" cy="369332"/>
+          </a:xfrm>
+          <a:prstGeom prst="rect">
+            <a:avLst/>
+          </a:prstGeom>
+          <a:noFill/>
+        </p:spPr>
+        <p:txBody>
+          <a:bodyPr wrap="none" rtlCol="0">
+            <a:spAutoFit/>
+          </a:bodyPr>
+          <a:lstStyle/>
+          <a:p>
+            <a:r>
+              <a:rPr lang="en-US" dirty="0" smtClean="0"/>
+              <a:t>Calls to Recursive </a:t>
+            </a:r>
+            <a:r>
+              <a:rPr lang="en-US" dirty="0" smtClean="0"/>
+              <a:t>Permutations for [</a:t>
+            </a:r>
+            <a:r>
+              <a:rPr lang="en-US" dirty="0" err="1" smtClean="0"/>
+              <a:t>a,b,c,d</a:t>
+            </a:r>
+            <a:r>
+              <a:rPr lang="en-US" dirty="0" smtClean="0"/>
+              <a:t>], one branch</a:t>
+            </a:r>
+            <a:endParaRPr lang="en-US" dirty="0"/>
+          </a:p>
+        </p:txBody>
+      </p:sp>
+      <p:cxnSp>
+        <p:nvCxnSpPr>
+          <p:cNvPr id="91" name="Straight Arrow Connector 90"/>
+          <p:cNvCxnSpPr>
+            <a:stCxn id="4" idx="2"/>
+            <a:endCxn id="55" idx="0"/>
+          </p:cNvCxnSpPr>
+          <p:nvPr/>
+        </p:nvCxnSpPr>
+        <p:spPr>
+          <a:xfrm>
+            <a:off x="4683650" y="1740932"/>
+            <a:ext cx="3583118" cy="1230868"/>
+          </a:xfrm>
+          <a:prstGeom prst="straightConnector1">
+            <a:avLst/>
+          </a:prstGeom>
+          <a:ln>
+            <a:solidFill>
+              <a:schemeClr val="bg1">
+                <a:lumMod val="65000"/>
+              </a:schemeClr>
+            </a:solidFill>
+            <a:tailEnd type="arrow"/>
+          </a:ln>
+        </p:spPr>
+        <p:style>
+          <a:lnRef idx="1">
+            <a:schemeClr val="accent1"/>
+          </a:lnRef>
+          <a:fillRef idx="0">
+            <a:schemeClr val="accent1"/>
+          </a:fillRef>
+          <a:effectRef idx="0">
+            <a:schemeClr val="accent1"/>
+          </a:effectRef>
+          <a:fontRef idx="minor">
+            <a:schemeClr val="tx1"/>
+          </a:fontRef>
+        </p:style>
+      </p:cxnSp>
+      <p:sp>
+        <p:nvSpPr>
+          <p:cNvPr id="98" name="TextBox 97"/>
+          <p:cNvSpPr txBox="1"/>
+          <p:nvPr/>
+        </p:nvSpPr>
+        <p:spPr>
+          <a:xfrm>
+            <a:off x="8649096" y="4202668"/>
+            <a:ext cx="418704" cy="369332"/>
+          </a:xfrm>
+          <a:prstGeom prst="rect">
+            <a:avLst/>
+          </a:prstGeom>
+          <a:noFill/>
+        </p:spPr>
+        <p:txBody>
+          <a:bodyPr wrap="none" rtlCol="0">
+            <a:spAutoFit/>
+          </a:bodyPr>
+          <a:lstStyle/>
+          <a:p>
+            <a:r>
+              <a:rPr lang="en-US" dirty="0" smtClean="0"/>
+              <a:t>14</a:t>
+            </a:r>
+            <a:endParaRPr lang="en-US" dirty="0"/>
+          </a:p>
+        </p:txBody>
+      </p:sp>
+      <p:sp>
+        <p:nvSpPr>
+          <p:cNvPr id="53" name="TextBox 52"/>
+          <p:cNvSpPr txBox="1"/>
+          <p:nvPr/>
+        </p:nvSpPr>
+        <p:spPr>
+          <a:xfrm>
+            <a:off x="4874935" y="2971800"/>
+            <a:ext cx="1144865" cy="369332"/>
+          </a:xfrm>
+          <a:prstGeom prst="rect">
+            <a:avLst/>
+          </a:prstGeom>
+          <a:noFill/>
+          <a:ln>
+            <a:solidFill>
+              <a:schemeClr val="bg1">
+                <a:lumMod val="65000"/>
+              </a:schemeClr>
+            </a:solidFill>
+          </a:ln>
+        </p:spPr>
+        <p:txBody>
+          <a:bodyPr wrap="none" rtlCol="0">
+            <a:spAutoFit/>
+          </a:bodyPr>
+          <a:lstStyle/>
+          <a:p>
+            <a:r>
+              <a:rPr lang="en-US" dirty="0" smtClean="0"/>
+              <a:t>[b], [</a:t>
+            </a:r>
+            <a:r>
+              <a:rPr lang="en-US" dirty="0" err="1" smtClean="0"/>
+              <a:t>a</a:t>
+            </a:r>
+            <a:r>
+              <a:rPr lang="en-US" dirty="0" err="1" smtClean="0"/>
+              <a:t>,c,d</a:t>
+            </a:r>
+            <a:r>
+              <a:rPr lang="en-US" dirty="0" smtClean="0"/>
+              <a:t>]</a:t>
+            </a:r>
+            <a:endParaRPr lang="en-US" dirty="0"/>
+          </a:p>
+        </p:txBody>
+      </p:sp>
+      <p:sp>
+        <p:nvSpPr>
+          <p:cNvPr id="54" name="TextBox 53"/>
+          <p:cNvSpPr txBox="1"/>
+          <p:nvPr/>
+        </p:nvSpPr>
+        <p:spPr>
+          <a:xfrm>
+            <a:off x="6172200" y="2983468"/>
+            <a:ext cx="1144865" cy="369332"/>
+          </a:xfrm>
+          <a:prstGeom prst="rect">
+            <a:avLst/>
+          </a:prstGeom>
+          <a:noFill/>
+          <a:ln>
+            <a:solidFill>
+              <a:schemeClr val="bg1">
+                <a:lumMod val="65000"/>
+              </a:schemeClr>
+            </a:solidFill>
+          </a:ln>
+        </p:spPr>
+        <p:txBody>
+          <a:bodyPr wrap="none" rtlCol="0">
+            <a:spAutoFit/>
+          </a:bodyPr>
+          <a:lstStyle/>
+          <a:p>
+            <a:r>
+              <a:rPr lang="en-US" dirty="0" smtClean="0"/>
+              <a:t>[c], [</a:t>
+            </a:r>
+            <a:r>
+              <a:rPr lang="en-US" dirty="0" err="1" smtClean="0"/>
+              <a:t>a</a:t>
+            </a:r>
+            <a:r>
+              <a:rPr lang="en-US" dirty="0" err="1" smtClean="0"/>
+              <a:t>,b,d</a:t>
+            </a:r>
+            <a:r>
+              <a:rPr lang="en-US" dirty="0" smtClean="0"/>
+              <a:t>]</a:t>
+            </a:r>
+            <a:endParaRPr lang="en-US" dirty="0"/>
+          </a:p>
+        </p:txBody>
+      </p:sp>
+      <p:sp>
+        <p:nvSpPr>
+          <p:cNvPr id="55" name="TextBox 54"/>
+          <p:cNvSpPr txBox="1"/>
+          <p:nvPr/>
+        </p:nvSpPr>
+        <p:spPr>
+          <a:xfrm>
+            <a:off x="7694335" y="2971800"/>
+            <a:ext cx="1144865" cy="369332"/>
+          </a:xfrm>
+          <a:prstGeom prst="rect">
+            <a:avLst/>
+          </a:prstGeom>
+          <a:noFill/>
+          <a:ln>
+            <a:solidFill>
+              <a:schemeClr val="bg1">
+                <a:lumMod val="65000"/>
+              </a:schemeClr>
+            </a:solidFill>
+          </a:ln>
+        </p:spPr>
+        <p:txBody>
+          <a:bodyPr wrap="none" rtlCol="0">
+            <a:spAutoFit/>
+          </a:bodyPr>
+          <a:lstStyle/>
+          <a:p>
+            <a:r>
+              <a:rPr lang="en-US" dirty="0" smtClean="0"/>
+              <a:t>[d], [</a:t>
+            </a:r>
+            <a:r>
+              <a:rPr lang="en-US" dirty="0" err="1" smtClean="0"/>
+              <a:t>a,b,c</a:t>
+            </a:r>
+            <a:r>
+              <a:rPr lang="en-US" dirty="0" smtClean="0"/>
+              <a:t>]</a:t>
+            </a:r>
+            <a:endParaRPr lang="en-US" dirty="0"/>
+          </a:p>
+        </p:txBody>
+      </p:sp>
+      <p:cxnSp>
+        <p:nvCxnSpPr>
+          <p:cNvPr id="58" name="Straight Arrow Connector 57"/>
+          <p:cNvCxnSpPr>
+            <a:stCxn id="4" idx="2"/>
+            <a:endCxn id="53" idx="0"/>
+          </p:cNvCxnSpPr>
+          <p:nvPr/>
+        </p:nvCxnSpPr>
+        <p:spPr>
+          <a:xfrm>
+            <a:off x="4683650" y="1740932"/>
+            <a:ext cx="763718" cy="1230868"/>
+          </a:xfrm>
+          <a:prstGeom prst="straightConnector1">
+            <a:avLst/>
+          </a:prstGeom>
+          <a:ln>
+            <a:solidFill>
+              <a:schemeClr val="bg1">
+                <a:lumMod val="65000"/>
+              </a:schemeClr>
+            </a:solidFill>
+            <a:tailEnd type="arrow"/>
+          </a:ln>
+        </p:spPr>
+        <p:style>
+          <a:lnRef idx="1">
+            <a:schemeClr val="accent1"/>
+          </a:lnRef>
+          <a:fillRef idx="0">
+            <a:schemeClr val="accent1"/>
+          </a:fillRef>
+          <a:effectRef idx="0">
+            <a:schemeClr val="accent1"/>
+          </a:effectRef>
+          <a:fontRef idx="minor">
+            <a:schemeClr val="tx1"/>
+          </a:fontRef>
+        </p:style>
+      </p:cxnSp>
+      <p:sp>
+        <p:nvSpPr>
+          <p:cNvPr id="71" name="TextBox 70"/>
+          <p:cNvSpPr txBox="1"/>
+          <p:nvPr/>
+        </p:nvSpPr>
+        <p:spPr>
+          <a:xfrm>
+            <a:off x="7274382" y="3810000"/>
+            <a:ext cx="1219200" cy="369332"/>
+          </a:xfrm>
+          <a:prstGeom prst="rect">
+            <a:avLst/>
+          </a:prstGeom>
+          <a:noFill/>
+          <a:ln>
+            <a:solidFill>
+              <a:schemeClr val="bg1">
+                <a:lumMod val="65000"/>
+              </a:schemeClr>
+            </a:solidFill>
+          </a:ln>
+        </p:spPr>
+        <p:txBody>
+          <a:bodyPr wrap="square" rtlCol="0">
+            <a:spAutoFit/>
+          </a:bodyPr>
+          <a:lstStyle/>
+          <a:p>
+            <a:r>
+              <a:rPr lang="en-US" dirty="0" smtClean="0"/>
+              <a:t>[</a:t>
+            </a:r>
+            <a:r>
+              <a:rPr lang="en-US" dirty="0" err="1" smtClean="0"/>
+              <a:t>a,d</a:t>
+            </a:r>
+            <a:r>
+              <a:rPr lang="en-US" dirty="0" smtClean="0"/>
+              <a:t>], </a:t>
+            </a:r>
+            <a:r>
+              <a:rPr lang="en-US" dirty="0" smtClean="0"/>
+              <a:t>[</a:t>
+            </a:r>
+            <a:r>
+              <a:rPr lang="en-US" dirty="0" err="1" smtClean="0"/>
+              <a:t>b,c</a:t>
+            </a:r>
+            <a:r>
+              <a:rPr lang="en-US" dirty="0" smtClean="0"/>
+              <a:t>]</a:t>
+            </a:r>
+            <a:endParaRPr lang="en-US" dirty="0"/>
+          </a:p>
+        </p:txBody>
+      </p:sp>
+      <p:cxnSp>
+        <p:nvCxnSpPr>
+          <p:cNvPr id="74" name="Straight Arrow Connector 73"/>
+          <p:cNvCxnSpPr>
+            <a:stCxn id="5" idx="2"/>
+            <a:endCxn id="71" idx="0"/>
+          </p:cNvCxnSpPr>
+          <p:nvPr/>
+        </p:nvCxnSpPr>
+        <p:spPr>
+          <a:xfrm>
+            <a:off x="2934633" y="3341132"/>
+            <a:ext cx="4949349" cy="468868"/>
+          </a:xfrm>
+          <a:prstGeom prst="straightConnector1">
+            <a:avLst/>
+          </a:prstGeom>
+          <a:ln>
+            <a:solidFill>
+              <a:srgbClr val="00B050"/>
+            </a:solidFill>
+            <a:tailEnd type="arrow"/>
+          </a:ln>
+        </p:spPr>
+        <p:style>
+          <a:lnRef idx="1">
+            <a:schemeClr val="accent1"/>
+          </a:lnRef>
+          <a:fillRef idx="0">
+            <a:schemeClr val="accent1"/>
+          </a:fillRef>
+          <a:effectRef idx="0">
+            <a:schemeClr val="accent1"/>
+          </a:effectRef>
+          <a:fontRef idx="minor">
+            <a:schemeClr val="tx1"/>
+          </a:fontRef>
+        </p:style>
+      </p:cxnSp>
+      <p:sp>
+        <p:nvSpPr>
+          <p:cNvPr id="82" name="TextBox 81"/>
+          <p:cNvSpPr txBox="1"/>
+          <p:nvPr/>
+        </p:nvSpPr>
+        <p:spPr>
+          <a:xfrm>
+            <a:off x="1064935" y="4648200"/>
+            <a:ext cx="1144865" cy="369332"/>
+          </a:xfrm>
+          <a:prstGeom prst="rect">
+            <a:avLst/>
+          </a:prstGeom>
+          <a:noFill/>
+          <a:ln>
+            <a:solidFill>
+              <a:schemeClr val="bg1">
+                <a:lumMod val="65000"/>
+              </a:schemeClr>
+            </a:solidFill>
+          </a:ln>
+        </p:spPr>
+        <p:txBody>
+          <a:bodyPr wrap="none" rtlCol="0">
+            <a:spAutoFit/>
+          </a:bodyPr>
+          <a:lstStyle/>
+          <a:p>
+            <a:r>
+              <a:rPr lang="en-US" dirty="0" smtClean="0"/>
+              <a:t>[</a:t>
+            </a:r>
+            <a:r>
+              <a:rPr lang="en-US" dirty="0" err="1" smtClean="0"/>
+              <a:t>a,b,c</a:t>
+            </a:r>
+            <a:r>
+              <a:rPr lang="en-US" dirty="0" smtClean="0"/>
+              <a:t>], [d]</a:t>
+            </a:r>
+            <a:endParaRPr lang="en-US" dirty="0"/>
+          </a:p>
+        </p:txBody>
+      </p:sp>
+      <p:sp>
+        <p:nvSpPr>
+          <p:cNvPr id="84" name="TextBox 83"/>
+          <p:cNvSpPr txBox="1"/>
+          <p:nvPr/>
+        </p:nvSpPr>
+        <p:spPr>
+          <a:xfrm>
+            <a:off x="2360335" y="4659868"/>
+            <a:ext cx="1144865" cy="369332"/>
+          </a:xfrm>
+          <a:prstGeom prst="rect">
+            <a:avLst/>
+          </a:prstGeom>
+          <a:noFill/>
+          <a:ln>
+            <a:solidFill>
+              <a:schemeClr val="bg1">
+                <a:lumMod val="65000"/>
+              </a:schemeClr>
+            </a:solidFill>
+          </a:ln>
+        </p:spPr>
+        <p:txBody>
+          <a:bodyPr wrap="none" rtlCol="0">
+            <a:spAutoFit/>
+          </a:bodyPr>
+          <a:lstStyle/>
+          <a:p>
+            <a:r>
+              <a:rPr lang="en-US" dirty="0" smtClean="0"/>
+              <a:t>[</a:t>
+            </a:r>
+            <a:r>
+              <a:rPr lang="en-US" dirty="0" err="1" smtClean="0"/>
+              <a:t>a,b,d</a:t>
+            </a:r>
+            <a:r>
+              <a:rPr lang="en-US" dirty="0" smtClean="0"/>
+              <a:t>], </a:t>
+            </a:r>
+            <a:r>
+              <a:rPr lang="en-US" dirty="0" smtClean="0"/>
+              <a:t>[</a:t>
+            </a:r>
+            <a:r>
+              <a:rPr lang="en-US" dirty="0" smtClean="0"/>
+              <a:t>c]</a:t>
+            </a:r>
+            <a:endParaRPr lang="en-US" dirty="0"/>
+          </a:p>
+        </p:txBody>
+      </p:sp>
+      <p:sp>
+        <p:nvSpPr>
+          <p:cNvPr id="101" name="TextBox 100"/>
+          <p:cNvSpPr txBox="1"/>
+          <p:nvPr/>
+        </p:nvSpPr>
+        <p:spPr>
+          <a:xfrm>
+            <a:off x="3655735" y="4648200"/>
+            <a:ext cx="1144865" cy="369332"/>
+          </a:xfrm>
+          <a:prstGeom prst="rect">
+            <a:avLst/>
+          </a:prstGeom>
+          <a:noFill/>
+          <a:ln>
+            <a:solidFill>
+              <a:schemeClr val="bg1">
+                <a:lumMod val="65000"/>
+              </a:schemeClr>
+            </a:solidFill>
+          </a:ln>
+        </p:spPr>
+        <p:txBody>
+          <a:bodyPr wrap="none" rtlCol="0">
+            <a:spAutoFit/>
+          </a:bodyPr>
+          <a:lstStyle/>
+          <a:p>
+            <a:r>
+              <a:rPr lang="en-US" dirty="0" smtClean="0"/>
+              <a:t>[</a:t>
+            </a:r>
+            <a:r>
+              <a:rPr lang="en-US" dirty="0" err="1" smtClean="0"/>
+              <a:t>a,c,b</a:t>
+            </a:r>
+            <a:r>
+              <a:rPr lang="en-US" dirty="0" smtClean="0"/>
+              <a:t>], [d]</a:t>
+            </a:r>
+            <a:endParaRPr lang="en-US" dirty="0"/>
+          </a:p>
+        </p:txBody>
+      </p:sp>
+      <p:sp>
+        <p:nvSpPr>
+          <p:cNvPr id="102" name="TextBox 101"/>
+          <p:cNvSpPr txBox="1"/>
+          <p:nvPr/>
+        </p:nvSpPr>
+        <p:spPr>
+          <a:xfrm>
+            <a:off x="4951135" y="4659868"/>
+            <a:ext cx="1144865" cy="369332"/>
+          </a:xfrm>
+          <a:prstGeom prst="rect">
+            <a:avLst/>
+          </a:prstGeom>
+          <a:noFill/>
+          <a:ln>
+            <a:solidFill>
+              <a:schemeClr val="bg1">
+                <a:lumMod val="65000"/>
+              </a:schemeClr>
+            </a:solidFill>
+          </a:ln>
+        </p:spPr>
+        <p:txBody>
+          <a:bodyPr wrap="none" rtlCol="0">
+            <a:spAutoFit/>
+          </a:bodyPr>
+          <a:lstStyle/>
+          <a:p>
+            <a:r>
+              <a:rPr lang="en-US" dirty="0" smtClean="0"/>
+              <a:t>[</a:t>
+            </a:r>
+            <a:r>
+              <a:rPr lang="en-US" dirty="0" err="1" smtClean="0"/>
+              <a:t>a,c,d</a:t>
+            </a:r>
+            <a:r>
+              <a:rPr lang="en-US" dirty="0" smtClean="0"/>
+              <a:t>], [</a:t>
+            </a:r>
+            <a:r>
+              <a:rPr lang="en-US" dirty="0" smtClean="0"/>
+              <a:t>b</a:t>
+            </a:r>
+            <a:r>
+              <a:rPr lang="en-US" dirty="0" smtClean="0"/>
+              <a:t>]</a:t>
+            </a:r>
+            <a:endParaRPr lang="en-US" dirty="0"/>
+          </a:p>
+        </p:txBody>
+      </p:sp>
+      <p:cxnSp>
+        <p:nvCxnSpPr>
+          <p:cNvPr id="106" name="Straight Arrow Connector 105"/>
+          <p:cNvCxnSpPr>
+            <a:stCxn id="9" idx="2"/>
+            <a:endCxn id="101" idx="0"/>
+          </p:cNvCxnSpPr>
+          <p:nvPr/>
+        </p:nvCxnSpPr>
+        <p:spPr>
+          <a:xfrm flipH="1">
+            <a:off x="4228168" y="4179332"/>
+            <a:ext cx="684867" cy="468868"/>
+          </a:xfrm>
+          <a:prstGeom prst="straightConnector1">
+            <a:avLst/>
+          </a:prstGeom>
+          <a:ln>
+            <a:solidFill>
+              <a:srgbClr val="00B050"/>
+            </a:solidFill>
+            <a:tailEnd type="arrow"/>
+          </a:ln>
+        </p:spPr>
+        <p:style>
+          <a:lnRef idx="1">
+            <a:schemeClr val="accent1"/>
+          </a:lnRef>
+          <a:fillRef idx="0">
+            <a:schemeClr val="accent1"/>
+          </a:fillRef>
+          <a:effectRef idx="0">
+            <a:schemeClr val="accent1"/>
+          </a:effectRef>
+          <a:fontRef idx="minor">
+            <a:schemeClr val="tx1"/>
+          </a:fontRef>
+        </p:style>
+      </p:cxnSp>
+      <p:cxnSp>
+        <p:nvCxnSpPr>
+          <p:cNvPr id="109" name="Straight Arrow Connector 108"/>
+          <p:cNvCxnSpPr>
+            <a:stCxn id="9" idx="2"/>
+            <a:endCxn id="102" idx="0"/>
+          </p:cNvCxnSpPr>
+          <p:nvPr/>
+        </p:nvCxnSpPr>
+        <p:spPr>
+          <a:xfrm>
+            <a:off x="4913035" y="4179332"/>
+            <a:ext cx="610533" cy="480536"/>
+          </a:xfrm>
+          <a:prstGeom prst="straightConnector1">
+            <a:avLst/>
+          </a:prstGeom>
+          <a:ln>
+            <a:solidFill>
+              <a:srgbClr val="00B050"/>
+            </a:solidFill>
+            <a:tailEnd type="arrow"/>
+          </a:ln>
+        </p:spPr>
+        <p:style>
+          <a:lnRef idx="1">
+            <a:schemeClr val="accent1"/>
+          </a:lnRef>
+          <a:fillRef idx="0">
+            <a:schemeClr val="accent1"/>
+          </a:fillRef>
+          <a:effectRef idx="0">
+            <a:schemeClr val="accent1"/>
+          </a:effectRef>
+          <a:fontRef idx="minor">
+            <a:schemeClr val="tx1"/>
+          </a:fontRef>
+        </p:style>
+      </p:cxnSp>
+      <p:sp>
+        <p:nvSpPr>
+          <p:cNvPr id="112" name="TextBox 111"/>
+          <p:cNvSpPr txBox="1"/>
+          <p:nvPr/>
+        </p:nvSpPr>
+        <p:spPr>
+          <a:xfrm>
+            <a:off x="6283782" y="4648200"/>
+            <a:ext cx="1144865" cy="369332"/>
+          </a:xfrm>
+          <a:prstGeom prst="rect">
+            <a:avLst/>
+          </a:prstGeom>
+          <a:noFill/>
+          <a:ln>
+            <a:solidFill>
+              <a:schemeClr val="bg1">
+                <a:lumMod val="65000"/>
+              </a:schemeClr>
+            </a:solidFill>
+          </a:ln>
+        </p:spPr>
+        <p:txBody>
+          <a:bodyPr wrap="none" rtlCol="0">
+            <a:spAutoFit/>
+          </a:bodyPr>
+          <a:lstStyle/>
+          <a:p>
+            <a:r>
+              <a:rPr lang="en-US" dirty="0" smtClean="0"/>
+              <a:t>[</a:t>
+            </a:r>
+            <a:r>
+              <a:rPr lang="en-US" dirty="0" err="1" smtClean="0"/>
+              <a:t>a,d,b</a:t>
+            </a:r>
+            <a:r>
+              <a:rPr lang="en-US" dirty="0" smtClean="0"/>
+              <a:t>], [c]</a:t>
+            </a:r>
+            <a:endParaRPr lang="en-US" dirty="0"/>
+          </a:p>
+        </p:txBody>
+      </p:sp>
+      <p:sp>
+        <p:nvSpPr>
+          <p:cNvPr id="113" name="TextBox 112"/>
+          <p:cNvSpPr txBox="1"/>
+          <p:nvPr/>
+        </p:nvSpPr>
+        <p:spPr>
+          <a:xfrm>
+            <a:off x="7807782" y="4648200"/>
+            <a:ext cx="1144865" cy="369332"/>
+          </a:xfrm>
+          <a:prstGeom prst="rect">
+            <a:avLst/>
+          </a:prstGeom>
+          <a:noFill/>
+          <a:ln>
+            <a:solidFill>
+              <a:schemeClr val="bg1">
+                <a:lumMod val="65000"/>
+              </a:schemeClr>
+            </a:solidFill>
+          </a:ln>
+        </p:spPr>
+        <p:txBody>
+          <a:bodyPr wrap="none" rtlCol="0">
+            <a:spAutoFit/>
+          </a:bodyPr>
+          <a:lstStyle/>
+          <a:p>
+            <a:r>
+              <a:rPr lang="en-US" dirty="0" smtClean="0"/>
+              <a:t>[</a:t>
+            </a:r>
+            <a:r>
+              <a:rPr lang="en-US" dirty="0" err="1" smtClean="0"/>
+              <a:t>a,d,c</a:t>
+            </a:r>
+            <a:r>
+              <a:rPr lang="en-US" dirty="0" smtClean="0"/>
+              <a:t>], [</a:t>
+            </a:r>
+            <a:r>
+              <a:rPr lang="en-US" dirty="0" smtClean="0"/>
+              <a:t>b</a:t>
+            </a:r>
+            <a:r>
+              <a:rPr lang="en-US" dirty="0" smtClean="0"/>
+              <a:t>]</a:t>
+            </a:r>
+            <a:endParaRPr lang="en-US" dirty="0"/>
+          </a:p>
+        </p:txBody>
+      </p:sp>
+      <p:cxnSp>
+        <p:nvCxnSpPr>
+          <p:cNvPr id="114" name="Straight Arrow Connector 113"/>
+          <p:cNvCxnSpPr>
+            <a:stCxn id="71" idx="2"/>
+            <a:endCxn id="113" idx="0"/>
+          </p:cNvCxnSpPr>
+          <p:nvPr/>
+        </p:nvCxnSpPr>
+        <p:spPr>
+          <a:xfrm>
+            <a:off x="7883982" y="4179332"/>
+            <a:ext cx="496233" cy="468868"/>
+          </a:xfrm>
+          <a:prstGeom prst="straightConnector1">
+            <a:avLst/>
+          </a:prstGeom>
+          <a:ln>
+            <a:solidFill>
+              <a:srgbClr val="00B050"/>
+            </a:solidFill>
+            <a:tailEnd type="arrow"/>
+          </a:ln>
+        </p:spPr>
+        <p:style>
+          <a:lnRef idx="1">
+            <a:schemeClr val="accent1"/>
+          </a:lnRef>
+          <a:fillRef idx="0">
+            <a:schemeClr val="accent1"/>
+          </a:fillRef>
+          <a:effectRef idx="0">
+            <a:schemeClr val="accent1"/>
+          </a:effectRef>
+          <a:fontRef idx="minor">
+            <a:schemeClr val="tx1"/>
+          </a:fontRef>
+        </p:style>
+      </p:cxnSp>
+      <p:cxnSp>
+        <p:nvCxnSpPr>
+          <p:cNvPr id="117" name="Straight Arrow Connector 116"/>
+          <p:cNvCxnSpPr>
+            <a:stCxn id="71" idx="2"/>
+            <a:endCxn id="112" idx="0"/>
+          </p:cNvCxnSpPr>
+          <p:nvPr/>
+        </p:nvCxnSpPr>
+        <p:spPr>
+          <a:xfrm flipH="1">
+            <a:off x="6856215" y="4179332"/>
+            <a:ext cx="1027767" cy="468868"/>
+          </a:xfrm>
+          <a:prstGeom prst="straightConnector1">
+            <a:avLst/>
+          </a:prstGeom>
+          <a:ln>
+            <a:solidFill>
+              <a:srgbClr val="00B050"/>
+            </a:solidFill>
+            <a:tailEnd type="arrow"/>
+          </a:ln>
+        </p:spPr>
+        <p:style>
+          <a:lnRef idx="1">
+            <a:schemeClr val="accent1"/>
+          </a:lnRef>
+          <a:fillRef idx="0">
+            <a:schemeClr val="accent1"/>
+          </a:fillRef>
+          <a:effectRef idx="0">
+            <a:schemeClr val="accent1"/>
+          </a:effectRef>
+          <a:fontRef idx="minor">
+            <a:schemeClr val="tx1"/>
+          </a:fontRef>
+        </p:style>
+      </p:cxnSp>
+      <p:cxnSp>
+        <p:nvCxnSpPr>
+          <p:cNvPr id="120" name="Straight Arrow Connector 119"/>
+          <p:cNvCxnSpPr>
+            <a:stCxn id="82" idx="2"/>
+            <a:endCxn id="7" idx="0"/>
+          </p:cNvCxnSpPr>
+          <p:nvPr/>
+        </p:nvCxnSpPr>
+        <p:spPr>
+          <a:xfrm flipH="1">
+            <a:off x="1618336" y="5017532"/>
+            <a:ext cx="19032" cy="937736"/>
+          </a:xfrm>
+          <a:prstGeom prst="straightConnector1">
+            <a:avLst/>
+          </a:prstGeom>
+          <a:ln>
+            <a:solidFill>
+              <a:srgbClr val="00B050"/>
+            </a:solidFill>
+            <a:tailEnd type="arrow"/>
+          </a:ln>
+        </p:spPr>
+        <p:style>
+          <a:lnRef idx="1">
+            <a:schemeClr val="accent1"/>
+          </a:lnRef>
+          <a:fillRef idx="0">
+            <a:schemeClr val="accent1"/>
+          </a:fillRef>
+          <a:effectRef idx="0">
+            <a:schemeClr val="accent1"/>
+          </a:effectRef>
+          <a:fontRef idx="minor">
+            <a:schemeClr val="tx1"/>
+          </a:fontRef>
+        </p:style>
+      </p:cxnSp>
+      <p:cxnSp>
+        <p:nvCxnSpPr>
+          <p:cNvPr id="129" name="Straight Arrow Connector 128"/>
+          <p:cNvCxnSpPr>
+            <a:stCxn id="84" idx="2"/>
+            <a:endCxn id="10" idx="0"/>
+          </p:cNvCxnSpPr>
+          <p:nvPr/>
+        </p:nvCxnSpPr>
+        <p:spPr>
+          <a:xfrm>
+            <a:off x="2932768" y="5029200"/>
+            <a:ext cx="93351" cy="926068"/>
+          </a:xfrm>
+          <a:prstGeom prst="straightConnector1">
+            <a:avLst/>
+          </a:prstGeom>
+          <a:ln>
+            <a:solidFill>
+              <a:srgbClr val="00B050"/>
+            </a:solidFill>
+            <a:tailEnd type="arrow"/>
+          </a:ln>
+        </p:spPr>
+        <p:style>
+          <a:lnRef idx="1">
+            <a:schemeClr val="accent1"/>
+          </a:lnRef>
+          <a:fillRef idx="0">
+            <a:schemeClr val="accent1"/>
+          </a:fillRef>
+          <a:effectRef idx="0">
+            <a:schemeClr val="accent1"/>
+          </a:effectRef>
+          <a:fontRef idx="minor">
+            <a:schemeClr val="tx1"/>
+          </a:fontRef>
+        </p:style>
+      </p:cxnSp>
+      <p:sp>
+        <p:nvSpPr>
+          <p:cNvPr id="132" name="TextBox 131"/>
+          <p:cNvSpPr txBox="1"/>
+          <p:nvPr/>
+        </p:nvSpPr>
+        <p:spPr>
+          <a:xfrm>
+            <a:off x="3810000" y="5943600"/>
+            <a:ext cx="1327837" cy="369332"/>
+          </a:xfrm>
+          <a:prstGeom prst="rect">
+            <a:avLst/>
+          </a:prstGeom>
+          <a:noFill/>
+          <a:ln w="31750">
+            <a:solidFill>
+              <a:srgbClr val="00B050"/>
+            </a:solidFill>
+          </a:ln>
+        </p:spPr>
+        <p:txBody>
+          <a:bodyPr wrap="square" rtlCol="0">
+            <a:spAutoFit/>
+          </a:bodyPr>
+          <a:lstStyle/>
+          <a:p>
+            <a:r>
+              <a:rPr lang="en-US" dirty="0" smtClean="0"/>
+              <a:t>[</a:t>
+            </a:r>
+            <a:r>
+              <a:rPr lang="en-US" dirty="0" err="1" smtClean="0"/>
+              <a:t>a,c,b,d</a:t>
+            </a:r>
+            <a:r>
+              <a:rPr lang="en-US" dirty="0" smtClean="0"/>
+              <a:t>], </a:t>
+            </a:r>
+            <a:r>
+              <a:rPr lang="en-US" dirty="0" smtClean="0"/>
+              <a:t>[]</a:t>
+            </a:r>
+            <a:endParaRPr lang="en-US" dirty="0"/>
+          </a:p>
+        </p:txBody>
+      </p:sp>
+      <p:sp>
+        <p:nvSpPr>
+          <p:cNvPr id="133" name="TextBox 132"/>
+          <p:cNvSpPr txBox="1"/>
+          <p:nvPr/>
+        </p:nvSpPr>
+        <p:spPr>
+          <a:xfrm>
+            <a:off x="5257800" y="5943600"/>
+            <a:ext cx="1327837" cy="369332"/>
+          </a:xfrm>
+          <a:prstGeom prst="rect">
+            <a:avLst/>
+          </a:prstGeom>
+          <a:noFill/>
+          <a:ln w="31750">
+            <a:solidFill>
+              <a:srgbClr val="00B050"/>
+            </a:solidFill>
+          </a:ln>
+        </p:spPr>
+        <p:txBody>
+          <a:bodyPr wrap="square" rtlCol="0">
+            <a:spAutoFit/>
+          </a:bodyPr>
+          <a:lstStyle/>
+          <a:p>
+            <a:r>
+              <a:rPr lang="en-US" dirty="0" smtClean="0"/>
+              <a:t>[</a:t>
+            </a:r>
+            <a:r>
+              <a:rPr lang="en-US" dirty="0" err="1" smtClean="0"/>
+              <a:t>a,c,d,b</a:t>
+            </a:r>
+            <a:r>
+              <a:rPr lang="en-US" dirty="0" smtClean="0"/>
+              <a:t>], </a:t>
+            </a:r>
+            <a:r>
+              <a:rPr lang="en-US" dirty="0" smtClean="0"/>
+              <a:t>[]</a:t>
+            </a:r>
+            <a:endParaRPr lang="en-US" dirty="0"/>
+          </a:p>
+        </p:txBody>
+      </p:sp>
+      <p:cxnSp>
+        <p:nvCxnSpPr>
+          <p:cNvPr id="134" name="Straight Arrow Connector 133"/>
+          <p:cNvCxnSpPr>
+            <a:stCxn id="101" idx="2"/>
+            <a:endCxn id="132" idx="0"/>
+          </p:cNvCxnSpPr>
+          <p:nvPr/>
+        </p:nvCxnSpPr>
+        <p:spPr>
+          <a:xfrm>
+            <a:off x="4228168" y="5017532"/>
+            <a:ext cx="245751" cy="926068"/>
+          </a:xfrm>
+          <a:prstGeom prst="straightConnector1">
+            <a:avLst/>
+          </a:prstGeom>
+          <a:ln>
+            <a:solidFill>
+              <a:srgbClr val="00B050"/>
+            </a:solidFill>
+            <a:tailEnd type="arrow"/>
+          </a:ln>
+        </p:spPr>
+        <p:style>
+          <a:lnRef idx="1">
+            <a:schemeClr val="accent1"/>
+          </a:lnRef>
+          <a:fillRef idx="0">
+            <a:schemeClr val="accent1"/>
+          </a:fillRef>
+          <a:effectRef idx="0">
+            <a:schemeClr val="accent1"/>
+          </a:effectRef>
+          <a:fontRef idx="minor">
+            <a:schemeClr val="tx1"/>
+          </a:fontRef>
+        </p:style>
+      </p:cxnSp>
+      <p:cxnSp>
+        <p:nvCxnSpPr>
+          <p:cNvPr id="137" name="Straight Arrow Connector 136"/>
+          <p:cNvCxnSpPr>
+            <a:stCxn id="102" idx="2"/>
+            <a:endCxn id="133" idx="0"/>
+          </p:cNvCxnSpPr>
+          <p:nvPr/>
+        </p:nvCxnSpPr>
+        <p:spPr>
+          <a:xfrm>
+            <a:off x="5523568" y="5029200"/>
+            <a:ext cx="398151" cy="914400"/>
+          </a:xfrm>
+          <a:prstGeom prst="straightConnector1">
+            <a:avLst/>
+          </a:prstGeom>
+          <a:ln>
+            <a:solidFill>
+              <a:srgbClr val="00B050"/>
+            </a:solidFill>
+            <a:tailEnd type="arrow"/>
+          </a:ln>
+        </p:spPr>
+        <p:style>
+          <a:lnRef idx="1">
+            <a:schemeClr val="accent1"/>
+          </a:lnRef>
+          <a:fillRef idx="0">
+            <a:schemeClr val="accent1"/>
+          </a:fillRef>
+          <a:effectRef idx="0">
+            <a:schemeClr val="accent1"/>
+          </a:effectRef>
+          <a:fontRef idx="minor">
+            <a:schemeClr val="tx1"/>
+          </a:fontRef>
+        </p:style>
+      </p:cxnSp>
     </p:spTree>
   </p:cSld>
   <p:clrMapOvr>
@@ -8633,11 +10136,7 @@
           <a:p>
             <a:r>
               <a:rPr lang="en-US" dirty="0" smtClean="0"/>
-              <a:t>Recursive </a:t>
-            </a:r>
-            <a:r>
-              <a:rPr lang="en-US" dirty="0" err="1" smtClean="0"/>
-              <a:t>backtrackcing</a:t>
+              <a:t>Exhaustive recursion is ‘exhaustive’</a:t>
             </a:r>
             <a:endParaRPr lang="en-US" dirty="0"/>
           </a:p>
@@ -8656,6 +10155,345 @@
         <p:spPr/>
         <p:txBody>
           <a:bodyPr>
+            <a:normAutofit/>
+          </a:bodyPr>
+          <a:lstStyle/>
+          <a:p>
+            <a:pPr>
+              <a:buNone/>
+            </a:pPr>
+            <a:r>
+              <a:rPr lang="en-US" sz="1800" dirty="0" err="1" smtClean="0"/>
+              <a:t>var</a:t>
+            </a:r>
+            <a:r>
+              <a:rPr lang="en-US" sz="1800" dirty="0" smtClean="0"/>
+              <a:t> </a:t>
+            </a:r>
+            <a:r>
+              <a:rPr lang="en-US" sz="1800" dirty="0" err="1" smtClean="0"/>
+              <a:t>recPerms</a:t>
+            </a:r>
+            <a:r>
+              <a:rPr lang="en-US" sz="1800" dirty="0" smtClean="0"/>
+              <a:t> = function(</a:t>
+            </a:r>
+            <a:r>
+              <a:rPr lang="en-US" sz="1800" dirty="0" err="1" smtClean="0"/>
+              <a:t>sofar</a:t>
+            </a:r>
+            <a:r>
+              <a:rPr lang="en-US" sz="1800" dirty="0" smtClean="0"/>
+              <a:t>, rest){ </a:t>
+            </a:r>
+          </a:p>
+          <a:p>
+            <a:pPr>
+              <a:buNone/>
+            </a:pPr>
+            <a:r>
+              <a:rPr lang="en-US" sz="1800" dirty="0" smtClean="0"/>
+              <a:t>  if( </a:t>
+            </a:r>
+            <a:r>
+              <a:rPr lang="en-US" sz="1800" dirty="0" err="1" smtClean="0"/>
+              <a:t>rest.length</a:t>
+            </a:r>
+            <a:r>
+              <a:rPr lang="en-US" sz="1800" dirty="0" smtClean="0"/>
+              <a:t> === 0) { </a:t>
+            </a:r>
+          </a:p>
+          <a:p>
+            <a:pPr>
+              <a:buNone/>
+            </a:pPr>
+            <a:r>
+              <a:rPr lang="en-US" sz="1800" dirty="0" smtClean="0"/>
+              <a:t>    console.log(‘base case reached:’, </a:t>
+            </a:r>
+            <a:r>
+              <a:rPr lang="en-US" sz="1800" dirty="0" err="1" smtClean="0"/>
+              <a:t>sofar</a:t>
+            </a:r>
+            <a:r>
+              <a:rPr lang="en-US" sz="1800" dirty="0" smtClean="0"/>
+              <a:t>);</a:t>
+            </a:r>
+          </a:p>
+          <a:p>
+            <a:pPr>
+              <a:buNone/>
+            </a:pPr>
+            <a:r>
+              <a:rPr lang="en-US" sz="1800" dirty="0" smtClean="0"/>
+              <a:t>  } else { </a:t>
+            </a:r>
+          </a:p>
+          <a:p>
+            <a:pPr>
+              <a:buNone/>
+            </a:pPr>
+            <a:r>
+              <a:rPr lang="en-US" sz="1800" dirty="0" smtClean="0"/>
+              <a:t>    for( </a:t>
+            </a:r>
+            <a:r>
+              <a:rPr lang="en-US" sz="1800" dirty="0" err="1" smtClean="0"/>
+              <a:t>var</a:t>
+            </a:r>
+            <a:r>
+              <a:rPr lang="en-US" sz="1800" dirty="0" smtClean="0"/>
+              <a:t> </a:t>
+            </a:r>
+            <a:r>
+              <a:rPr lang="en-US" sz="1800" dirty="0" err="1" smtClean="0"/>
+              <a:t>i</a:t>
+            </a:r>
+            <a:r>
+              <a:rPr lang="en-US" sz="1800" dirty="0" smtClean="0"/>
+              <a:t> = 0; </a:t>
+            </a:r>
+            <a:r>
+              <a:rPr lang="en-US" sz="1800" dirty="0" err="1" smtClean="0"/>
+              <a:t>i</a:t>
+            </a:r>
+            <a:r>
+              <a:rPr lang="en-US" sz="1800" dirty="0" smtClean="0"/>
+              <a:t> &lt; </a:t>
+            </a:r>
+            <a:r>
+              <a:rPr lang="en-US" sz="1800" dirty="0" err="1" smtClean="0"/>
+              <a:t>rest.length</a:t>
+            </a:r>
+            <a:r>
+              <a:rPr lang="en-US" sz="1800" dirty="0" smtClean="0"/>
+              <a:t>; </a:t>
+            </a:r>
+            <a:r>
+              <a:rPr lang="en-US" sz="1800" dirty="0" err="1" smtClean="0"/>
+              <a:t>i</a:t>
+            </a:r>
+            <a:r>
+              <a:rPr lang="en-US" sz="1800" dirty="0" smtClean="0"/>
+              <a:t>++ ){ </a:t>
+            </a:r>
+          </a:p>
+          <a:p>
+            <a:pPr>
+              <a:buNone/>
+            </a:pPr>
+            <a:r>
+              <a:rPr lang="en-US" sz="1800" dirty="0" smtClean="0"/>
+              <a:t>      </a:t>
+            </a:r>
+            <a:r>
+              <a:rPr lang="en-US" sz="1800" dirty="0" err="1" smtClean="0"/>
+              <a:t>var</a:t>
+            </a:r>
+            <a:r>
+              <a:rPr lang="en-US" sz="1800" dirty="0" smtClean="0"/>
+              <a:t> remaining = </a:t>
+            </a:r>
+            <a:r>
+              <a:rPr lang="en-US" sz="1800" dirty="0" err="1" smtClean="0"/>
+              <a:t>rest.slice</a:t>
+            </a:r>
+            <a:r>
+              <a:rPr lang="en-US" sz="1800" dirty="0" smtClean="0"/>
+              <a:t>(); </a:t>
+            </a:r>
+          </a:p>
+          <a:p>
+            <a:pPr>
+              <a:buNone/>
+            </a:pPr>
+            <a:r>
+              <a:rPr lang="en-US" sz="1800" dirty="0" smtClean="0"/>
+              <a:t>      </a:t>
+            </a:r>
+            <a:r>
+              <a:rPr lang="en-US" sz="1800" dirty="0" err="1" smtClean="0"/>
+              <a:t>remaining.splice</a:t>
+            </a:r>
+            <a:r>
+              <a:rPr lang="en-US" sz="1800" dirty="0" smtClean="0"/>
+              <a:t>(</a:t>
+            </a:r>
+            <a:r>
+              <a:rPr lang="en-US" sz="1800" dirty="0" err="1" smtClean="0"/>
+              <a:t>i</a:t>
+            </a:r>
+            <a:r>
+              <a:rPr lang="en-US" sz="1800" dirty="0" smtClean="0"/>
+              <a:t>, 1); </a:t>
+            </a:r>
+          </a:p>
+          <a:p>
+            <a:pPr>
+              <a:buNone/>
+            </a:pPr>
+            <a:r>
+              <a:rPr lang="en-US" sz="1800" dirty="0" smtClean="0"/>
+              <a:t>      </a:t>
+            </a:r>
+            <a:r>
+              <a:rPr lang="en-US" sz="1800" dirty="0" err="1" smtClean="0"/>
+              <a:t>var</a:t>
+            </a:r>
+            <a:r>
+              <a:rPr lang="en-US" sz="1800" dirty="0" smtClean="0"/>
+              <a:t> next = </a:t>
+            </a:r>
+            <a:r>
+              <a:rPr lang="en-US" sz="1800" dirty="0" err="1" smtClean="0"/>
+              <a:t>sofar.slice</a:t>
+            </a:r>
+            <a:r>
+              <a:rPr lang="en-US" sz="1800" dirty="0" smtClean="0"/>
+              <a:t>(); </a:t>
+            </a:r>
+          </a:p>
+          <a:p>
+            <a:pPr>
+              <a:buNone/>
+            </a:pPr>
+            <a:r>
+              <a:rPr lang="en-US" sz="1800" dirty="0" smtClean="0"/>
+              <a:t>      </a:t>
+            </a:r>
+            <a:r>
+              <a:rPr lang="en-US" sz="1800" dirty="0" err="1" smtClean="0"/>
+              <a:t>next.push</a:t>
+            </a:r>
+            <a:r>
+              <a:rPr lang="en-US" sz="1800" dirty="0" smtClean="0"/>
+              <a:t>(rest[</a:t>
+            </a:r>
+            <a:r>
+              <a:rPr lang="en-US" sz="1800" dirty="0" err="1" smtClean="0"/>
+              <a:t>i</a:t>
+            </a:r>
+            <a:r>
+              <a:rPr lang="en-US" sz="1800" dirty="0" smtClean="0"/>
+              <a:t>]); </a:t>
+            </a:r>
+          </a:p>
+          <a:p>
+            <a:pPr>
+              <a:buNone/>
+            </a:pPr>
+            <a:r>
+              <a:rPr lang="en-US" sz="1800" dirty="0" smtClean="0"/>
+              <a:t>      </a:t>
+            </a:r>
+            <a:r>
+              <a:rPr lang="en-US" sz="1800" dirty="0" err="1" smtClean="0"/>
+              <a:t>recPerms</a:t>
+            </a:r>
+            <a:r>
+              <a:rPr lang="en-US" sz="1800" dirty="0" smtClean="0"/>
+              <a:t>(next, remaining);</a:t>
+            </a:r>
+          </a:p>
+          <a:p>
+            <a:pPr>
+              <a:buNone/>
+            </a:pPr>
+            <a:r>
+              <a:rPr lang="en-US" sz="1800" dirty="0" smtClean="0"/>
+              <a:t>    }</a:t>
+            </a:r>
+          </a:p>
+          <a:p>
+            <a:pPr>
+              <a:buNone/>
+            </a:pPr>
+            <a:r>
+              <a:rPr lang="en-US" sz="1800" dirty="0" smtClean="0"/>
+              <a:t>  }</a:t>
+            </a:r>
+          </a:p>
+          <a:p>
+            <a:pPr>
+              <a:buNone/>
+            </a:pPr>
+            <a:r>
+              <a:rPr lang="en-US" sz="1800" dirty="0" smtClean="0"/>
+              <a:t>}</a:t>
+            </a:r>
+          </a:p>
+        </p:txBody>
+      </p:sp>
+    </p:spTree>
+  </p:cSld>
+  <p:clrMapOvr>
+    <a:masterClrMapping/>
+  </p:clrMapOvr>
+</p:sld>
+</file>
+
+<file path=ppt/slides/slide6.xml><?xml version="1.0" encoding="utf-8"?>
+<p:sld xmlns:a="http://schemas.openxmlformats.org/drawingml/2006/main" xmlns:r="http://schemas.openxmlformats.org/officeDocument/2006/relationships" xmlns:p="http://schemas.openxmlformats.org/presentationml/2006/main">
+  <p:cSld>
+    <p:spTree>
+      <p:nvGrpSpPr>
+        <p:cNvPr id="1" name=""/>
+        <p:cNvGrpSpPr/>
+        <p:nvPr/>
+      </p:nvGrpSpPr>
+      <p:grpSpPr>
+        <a:xfrm>
+          <a:off x="0" y="0"/>
+          <a:ext cx="0" cy="0"/>
+          <a:chOff x="0" y="0"/>
+          <a:chExt cx="0" cy="0"/>
+        </a:xfrm>
+      </p:grpSpPr>
+      <p:sp>
+        <p:nvSpPr>
+          <p:cNvPr id="2" name="Title 1"/>
+          <p:cNvSpPr>
+            <a:spLocks noGrp="1"/>
+          </p:cNvSpPr>
+          <p:nvPr>
+            <p:ph type="title"/>
+          </p:nvPr>
+        </p:nvSpPr>
+        <p:spPr/>
+        <p:txBody>
+          <a:bodyPr/>
+          <a:lstStyle/>
+          <a:p>
+            <a:r>
+              <a:rPr lang="en-US" dirty="0" smtClean="0"/>
+              <a:t>Recursive </a:t>
+            </a:r>
+            <a:r>
+              <a:rPr lang="en-US" dirty="0" smtClean="0"/>
+              <a:t>back-</a:t>
+            </a:r>
+            <a:r>
+              <a:rPr lang="en-US" dirty="0" err="1" smtClean="0"/>
+              <a:t>trackcing</a:t>
+            </a:r>
+            <a:endParaRPr lang="en-US" dirty="0"/>
+          </a:p>
+        </p:txBody>
+      </p:sp>
+      <p:sp>
+        <p:nvSpPr>
+          <p:cNvPr id="3" name="Content Placeholder 2"/>
+          <p:cNvSpPr>
+            <a:spLocks noGrp="1"/>
+          </p:cNvSpPr>
+          <p:nvPr>
+            <p:ph idx="1"/>
+          </p:nvPr>
+        </p:nvSpPr>
+        <p:spPr/>
+        <p:txBody>
+          <a:bodyPr>
             <a:normAutofit fontScale="92500" lnSpcReduction="10000"/>
           </a:bodyPr>
           <a:lstStyle/>
@@ -8745,19 +10583,15 @@
             </a:pPr>
             <a:r>
               <a:rPr lang="en-US" sz="1400" dirty="0" smtClean="0"/>
-              <a:t> </a:t>
+              <a:t>  if( </a:t>
+            </a:r>
+            <a:r>
+              <a:rPr lang="en-US" sz="1400" dirty="0" err="1" smtClean="0"/>
+              <a:t>rest.length</a:t>
             </a:r>
             <a:r>
               <a:rPr lang="en-US" sz="1400" dirty="0" smtClean="0"/>
-              <a:t> if( dictionary[</a:t>
-            </a:r>
-            <a:r>
-              <a:rPr lang="en-US" sz="1400" dirty="0" err="1" smtClean="0"/>
-              <a:t>sofar</a:t>
-            </a:r>
-            <a:r>
-              <a:rPr lang="en-US" sz="1400" dirty="0" smtClean="0"/>
-              <a:t>]){ </a:t>
+              <a:t> === 0 ) {</a:t>
             </a:r>
           </a:p>
           <a:p>
@@ -8770,8 +10604,21 @@
             </a:r>
             <a:r>
               <a:rPr lang="en-US" sz="1400" dirty="0" smtClean="0"/>
-              <a:t>   return true; </a:t>
-            </a:r>
+              <a:t>   return </a:t>
+            </a:r>
+            <a:r>
+              <a:rPr lang="en-US" sz="1400" dirty="0" smtClean="0"/>
+              <a:t>dictionary[</a:t>
+            </a:r>
+            <a:r>
+              <a:rPr lang="en-US" sz="1400" dirty="0" err="1" smtClean="0"/>
+              <a:t>sofar</a:t>
+            </a:r>
+            <a:r>
+              <a:rPr lang="en-US" sz="1400" dirty="0" smtClean="0"/>
+              <a:t>]);</a:t>
+            </a:r>
+            <a:endParaRPr lang="en-US" sz="1400" dirty="0" smtClean="0"/>
           </a:p>
           <a:p>
             <a:pPr>
@@ -8779,11 +10626,7 @@
             </a:pPr>
             <a:r>
               <a:rPr lang="en-US" sz="1400" dirty="0" smtClean="0"/>
-              <a:t> </a:t>
-            </a:r>
-            <a:r>
-              <a:rPr lang="en-US" sz="1400" dirty="0" smtClean="0"/>
-              <a:t> } else { </a:t>
+              <a:t>  } else { </a:t>
             </a:r>
           </a:p>
           <a:p>
@@ -8792,11 +10635,7 @@
             </a:pPr>
             <a:r>
               <a:rPr lang="en-US" sz="1400" dirty="0" smtClean="0"/>
-              <a:t> </a:t>
-            </a:r>
-            <a:r>
-              <a:rPr lang="en-US" sz="1400" dirty="0" smtClean="0"/>
-              <a:t>   for( </a:t>
+              <a:t>    for( </a:t>
             </a:r>
             <a:r>
               <a:rPr lang="en-US" sz="1400" dirty="0" err="1" smtClean="0"/>
@@ -8845,11 +10684,7 @@
             </a:pPr>
             <a:r>
               <a:rPr lang="en-US" sz="1400" dirty="0" smtClean="0"/>
-              <a:t> </a:t>
-            </a:r>
-            <a:r>
-              <a:rPr lang="en-US" sz="1400" dirty="0" smtClean="0"/>
-              <a:t>     </a:t>
+              <a:t>      </a:t>
             </a:r>
             <a:r>
               <a:rPr lang="en-US" sz="1400" dirty="0" err="1" smtClean="0"/>
@@ -8882,11 +10717,7 @@
             </a:pPr>
             <a:r>
               <a:rPr lang="en-US" sz="1400" dirty="0" smtClean="0"/>
-              <a:t> </a:t>
-            </a:r>
-            <a:r>
-              <a:rPr lang="en-US" sz="1400" dirty="0" smtClean="0"/>
-              <a:t>     </a:t>
+              <a:t>      </a:t>
             </a:r>
             <a:r>
               <a:rPr lang="en-US" sz="1400" dirty="0" err="1" smtClean="0"/>
@@ -8927,11 +10758,7 @@
             </a:pPr>
             <a:r>
               <a:rPr lang="en-US" sz="1400" dirty="0" smtClean="0"/>
-              <a:t> </a:t>
-            </a:r>
-            <a:r>
-              <a:rPr lang="en-US" sz="1400" dirty="0" smtClean="0"/>
-              <a:t>     if( </a:t>
+              <a:t>      if( </a:t>
             </a:r>
             <a:r>
               <a:rPr lang="en-US" sz="1400" dirty="0" err="1" smtClean="0"/>
@@ -8948,13 +10775,8 @@
             </a:pPr>
             <a:r>
               <a:rPr lang="en-US" sz="1400" dirty="0" smtClean="0"/>
-              <a:t> </a:t>
-            </a:r>
-            <a:r>
-              <a:rPr lang="en-US" sz="1400" dirty="0" smtClean="0"/>
-              <a:t>       return true; </a:t>
-            </a:r>
-            <a:endParaRPr lang="en-US" sz="1400" dirty="0" smtClean="0"/>
+              <a:t>        return true; </a:t>
+            </a:r>
           </a:p>
           <a:p>
             <a:pPr>
@@ -8971,11 +10793,7 @@
             </a:pPr>
             <a:r>
               <a:rPr lang="en-US" sz="1400" dirty="0" smtClean="0"/>
-              <a:t> </a:t>
-            </a:r>
-            <a:r>
-              <a:rPr lang="en-US" sz="1400" dirty="0" smtClean="0"/>
-              <a:t>   }</a:t>
+              <a:t>    }</a:t>
             </a:r>
           </a:p>
           <a:p>
@@ -8984,11 +10802,7 @@
             </a:pPr>
             <a:r>
               <a:rPr lang="en-US" sz="1400" dirty="0" smtClean="0"/>
-              <a:t> </a:t>
-            </a:r>
-            <a:r>
-              <a:rPr lang="en-US" sz="1400" dirty="0" smtClean="0"/>
-              <a:t> }</a:t>
+              <a:t>  }</a:t>
             </a:r>
           </a:p>
           <a:p>
@@ -9014,6 +10828,170 @@
               <a:buNone/>
             </a:pPr>
             <a:endParaRPr lang="en-US" sz="1600" dirty="0" smtClean="0"/>
+          </a:p>
+        </p:txBody>
+      </p:sp>
+    </p:spTree>
+  </p:cSld>
+  <p:clrMapOvr>
+    <a:masterClrMapping/>
+  </p:clrMapOvr>
+</p:sld>
+</file>
+
+<file path=ppt/slides/slide7.xml><?xml version="1.0" encoding="utf-8"?>
+<p:sld xmlns:a="http://schemas.openxmlformats.org/drawingml/2006/main" xmlns:r="http://schemas.openxmlformats.org/officeDocument/2006/relationships" xmlns:p="http://schemas.openxmlformats.org/presentationml/2006/main">
+  <p:cSld>
+    <p:spTree>
+      <p:nvGrpSpPr>
+        <p:cNvPr id="1" name=""/>
+        <p:cNvGrpSpPr/>
+        <p:nvPr/>
+      </p:nvGrpSpPr>
+      <p:grpSpPr>
+        <a:xfrm>
+          <a:off x="0" y="0"/>
+          <a:ext cx="0" cy="0"/>
+          <a:chOff x="0" y="0"/>
+          <a:chExt cx="0" cy="0"/>
+        </a:xfrm>
+      </p:grpSpPr>
+      <p:sp>
+        <p:nvSpPr>
+          <p:cNvPr id="2" name="Title 1"/>
+          <p:cNvSpPr>
+            <a:spLocks noGrp="1"/>
+          </p:cNvSpPr>
+          <p:nvPr>
+            <p:ph type="title"/>
+          </p:nvPr>
+        </p:nvSpPr>
+        <p:spPr/>
+        <p:txBody>
+          <a:bodyPr/>
+          <a:lstStyle/>
+          <a:p>
+            <a:r>
+              <a:rPr lang="en-US" dirty="0" smtClean="0"/>
+              <a:t>Further Resources</a:t>
+            </a:r>
+            <a:endParaRPr lang="en-US" dirty="0"/>
+          </a:p>
+        </p:txBody>
+      </p:sp>
+      <p:sp>
+        <p:nvSpPr>
+          <p:cNvPr id="3" name="Content Placeholder 2"/>
+          <p:cNvSpPr>
+            <a:spLocks noGrp="1"/>
+          </p:cNvSpPr>
+          <p:nvPr>
+            <p:ph idx="1"/>
+          </p:nvPr>
+        </p:nvSpPr>
+        <p:spPr/>
+        <p:txBody>
+          <a:bodyPr>
+            <a:normAutofit/>
+          </a:bodyPr>
+          <a:lstStyle/>
+          <a:p>
+            <a:r>
+              <a:rPr lang="en-US" sz="2400" dirty="0" smtClean="0"/>
+              <a:t>Covered well by Stanford Engineering Everywhere Programming Abstractions, lectures 8-10 on </a:t>
+            </a:r>
+            <a:r>
+              <a:rPr lang="en-US" sz="2400" dirty="0" err="1" smtClean="0"/>
+              <a:t>youtube</a:t>
+            </a:r>
+            <a:endParaRPr lang="en-US" sz="2400" dirty="0" smtClean="0"/>
+          </a:p>
+          <a:p>
+            <a:pPr>
+              <a:buNone/>
+            </a:pPr>
+            <a:r>
+              <a:rPr lang="en-US" sz="2400" dirty="0" smtClean="0"/>
+              <a:t>Recursive subsets</a:t>
+            </a:r>
+          </a:p>
+          <a:p>
+            <a:pPr>
+              <a:buNone/>
+            </a:pPr>
+            <a:r>
+              <a:rPr lang="en-US" sz="2400" dirty="0" smtClean="0">
+                <a:hlinkClick r:id="rId2"/>
+              </a:rPr>
+              <a:t>https://</a:t>
+            </a:r>
+            <a:r>
+              <a:rPr lang="en-US" sz="2400" dirty="0" smtClean="0">
+                <a:hlinkClick r:id="rId2"/>
+              </a:rPr>
+              <a:t>www.youtube.com/watch?v=NdF1QDTRkck#t=12m19s</a:t>
+            </a:r>
+            <a:endParaRPr lang="en-US" sz="2400" dirty="0" smtClean="0"/>
+          </a:p>
+          <a:p>
+            <a:pPr>
+              <a:buNone/>
+            </a:pPr>
+            <a:r>
+              <a:rPr lang="en-US" sz="2400" dirty="0" smtClean="0"/>
+              <a:t>Recursive permutations: </a:t>
+            </a:r>
+          </a:p>
+          <a:p>
+            <a:pPr>
+              <a:buNone/>
+            </a:pPr>
+            <a:r>
+              <a:rPr lang="en-US" sz="2400" dirty="0" smtClean="0">
+                <a:hlinkClick r:id="rId3"/>
+              </a:rPr>
+              <a:t>https://</a:t>
+            </a:r>
+            <a:r>
+              <a:rPr lang="en-US" sz="2400" dirty="0" smtClean="0">
+                <a:hlinkClick r:id="rId3"/>
+              </a:rPr>
+              <a:t>www.youtube.com/watch?v=uFJhEPrbycQ#t=37m00s</a:t>
+            </a:r>
+            <a:endParaRPr lang="en-US" sz="2400" dirty="0" smtClean="0"/>
+          </a:p>
+          <a:p>
+            <a:pPr>
+              <a:buNone/>
+            </a:pPr>
+            <a:r>
+              <a:rPr lang="en-US" sz="2400" dirty="0" smtClean="0"/>
+              <a:t>Recursive back-tracking: </a:t>
+            </a:r>
+          </a:p>
+          <a:p>
+            <a:pPr>
+              <a:buNone/>
+            </a:pPr>
+            <a:r>
+              <a:rPr lang="en-US" sz="2400" dirty="0" smtClean="0">
+                <a:hlinkClick r:id="rId2"/>
+              </a:rPr>
+              <a:t>https://</a:t>
+            </a:r>
+            <a:r>
+              <a:rPr lang="en-US" sz="2400" dirty="0" smtClean="0">
+                <a:hlinkClick r:id="rId2"/>
+              </a:rPr>
+              <a:t>www.youtube.com/watch?v=NdF1QDTRkck#t=25m00s</a:t>
+            </a:r>
+            <a:endParaRPr lang="en-US" sz="2400" dirty="0" smtClean="0"/>
+          </a:p>
+          <a:p>
+            <a:pPr>
+              <a:buNone/>
+            </a:pPr>
+            <a:endParaRPr lang="en-US" sz="2400" dirty="0" smtClean="0"/>
           </a:p>
         </p:txBody>
       </p:sp>

</xml_diff>